<commit_message>
Fixed bug which wasn't grabbing the correct size for table placeholders
Added the ability to pass a change DF with the same dimensions as the base data for color-coding purpoes in the DTV import

Updated the Consumer KPI data layouts, as well as verbatim handling
</commit_message>
<xml_diff>
--- a/templates/OLD_TEMPLATE.pptx
+++ b/templates/OLD_TEMPLATE.pptx
@@ -6274,6 +6274,313 @@
 
 <file path=ppt/slideLayouts/slideLayout20.xml><?xml version="1.0" encoding="utf-8"?>
 <p:sldLayout xmlns:a="http://schemas.openxmlformats.org/drawingml/2006/main" xmlns:r="http://schemas.openxmlformats.org/officeDocument/2006/relationships" xmlns:p="http://schemas.openxmlformats.org/presentationml/2006/main" preserve="1" userDrawn="1">
+  <p:cSld name="TT_3_Chart_Equal">
+    <p:spTree>
+      <p:nvGrpSpPr>
+        <p:cNvPr id="1" name=""/>
+        <p:cNvGrpSpPr/>
+        <p:nvPr/>
+      </p:nvGrpSpPr>
+      <p:grpSpPr>
+        <a:xfrm>
+          <a:off x="0" y="0"/>
+          <a:ext cx="0" cy="0"/>
+          <a:chOff x="0" y="0"/>
+          <a:chExt cx="0" cy="0"/>
+        </a:xfrm>
+      </p:grpSpPr>
+      <p:sp>
+        <p:nvSpPr>
+          <p:cNvPr id="8" name="Chart 2">
+            <a:extLst>
+              <a:ext uri="{FF2B5EF4-FFF2-40B4-BE49-F238E27FC236}">
+                <a16:creationId xmlns:a16="http://schemas.microsoft.com/office/drawing/2014/main" id="{A52591D1-3F6E-428C-AE6B-D8A7DCF1BA78}"/>
+              </a:ext>
+            </a:extLst>
+          </p:cNvPr>
+          <p:cNvSpPr>
+            <a:spLocks noGrp="1"/>
+          </p:cNvSpPr>
+          <p:nvPr>
+            <p:ph type="chart" sz="quarter" idx="17"/>
+          </p:nvPr>
+        </p:nvSpPr>
+        <p:spPr>
+          <a:xfrm>
+            <a:off x="4372312" y="943244"/>
+            <a:ext cx="3456432" cy="4887188"/>
+          </a:xfrm>
+          <a:prstGeom prst="rect">
+            <a:avLst/>
+          </a:prstGeom>
+        </p:spPr>
+        <p:txBody>
+          <a:bodyPr/>
+          <a:lstStyle/>
+          <a:p>
+            <a:endParaRPr lang="en-US" dirty="0"/>
+          </a:p>
+        </p:txBody>
+      </p:sp>
+      <p:sp>
+        <p:nvSpPr>
+          <p:cNvPr id="7" name="Chart 1"/>
+          <p:cNvSpPr>
+            <a:spLocks noGrp="1"/>
+          </p:cNvSpPr>
+          <p:nvPr>
+            <p:ph type="chart" sz="quarter" idx="14"/>
+          </p:nvPr>
+        </p:nvSpPr>
+        <p:spPr>
+          <a:xfrm>
+            <a:off x="466255" y="943244"/>
+            <a:ext cx="3456432" cy="4887188"/>
+          </a:xfrm>
+          <a:prstGeom prst="rect">
+            <a:avLst/>
+          </a:prstGeom>
+        </p:spPr>
+        <p:txBody>
+          <a:bodyPr/>
+          <a:lstStyle>
+            <a:lvl1pPr>
+              <a:defRPr>
+                <a:solidFill>
+                  <a:schemeClr val="tx1"/>
+                </a:solidFill>
+              </a:defRPr>
+            </a:lvl1pPr>
+          </a:lstStyle>
+          <a:p>
+            <a:endParaRPr lang="en-US" dirty="0"/>
+          </a:p>
+        </p:txBody>
+      </p:sp>
+      <p:sp>
+        <p:nvSpPr>
+          <p:cNvPr id="6" name="PPH-SlideNo"/>
+          <p:cNvSpPr>
+            <a:spLocks noGrp="1"/>
+          </p:cNvSpPr>
+          <p:nvPr>
+            <p:ph type="sldNum" sz="quarter" idx="4"/>
+          </p:nvPr>
+        </p:nvSpPr>
+        <p:spPr>
+          <a:xfrm>
+            <a:off x="10608148" y="6550981"/>
+            <a:ext cx="1117599" cy="230823"/>
+          </a:xfrm>
+          <a:prstGeom prst="rect">
+            <a:avLst/>
+          </a:prstGeom>
+        </p:spPr>
+        <p:txBody>
+          <a:bodyPr vert="horz" wrap="none" lIns="0" tIns="0" rIns="0" bIns="0" rtlCol="0" anchor="b"/>
+          <a:lstStyle>
+            <a:lvl1pPr algn="r">
+              <a:spcBef>
+                <a:spcPts val="0"/>
+              </a:spcBef>
+              <a:defRPr sz="800" b="1">
+                <a:solidFill>
+                  <a:schemeClr val="bg2">
+                    <a:lumMod val="50000"/>
+                  </a:schemeClr>
+                </a:solidFill>
+                <a:latin typeface="+mn-lt"/>
+              </a:defRPr>
+            </a:lvl1pPr>
+          </a:lstStyle>
+          <a:p>
+            <a:pPr defTabSz="856716"/>
+            <a:fld id="{7B6B1C32-E567-445C-9FD5-2A0B0A08DD29}" type="slidenum">
+              <a:rPr lang="en-US" smtClean="0"/>
+              <a:pPr defTabSz="856716"/>
+              <a:t>‹#›</a:t>
+            </a:fld>
+            <a:endParaRPr lang="en-US" dirty="0"/>
+          </a:p>
+        </p:txBody>
+      </p:sp>
+      <p:sp>
+        <p:nvSpPr>
+          <p:cNvPr id="10" name="Section Tag">
+            <a:extLst>
+              <a:ext uri="{FF2B5EF4-FFF2-40B4-BE49-F238E27FC236}">
+                <a16:creationId xmlns:a16="http://schemas.microsoft.com/office/drawing/2014/main" id="{862632C5-CE1F-4714-B8E6-9C62993BDD97}"/>
+              </a:ext>
+            </a:extLst>
+          </p:cNvPr>
+          <p:cNvSpPr>
+            <a:spLocks noGrp="1"/>
+          </p:cNvSpPr>
+          <p:nvPr>
+            <p:ph type="body" sz="quarter" idx="16" hasCustomPrompt="1"/>
+          </p:nvPr>
+        </p:nvSpPr>
+        <p:spPr>
+          <a:xfrm>
+            <a:off x="457200" y="425325"/>
+            <a:ext cx="8343146" cy="298952"/>
+          </a:xfrm>
+          <a:prstGeom prst="rect">
+            <a:avLst/>
+          </a:prstGeom>
+        </p:spPr>
+        <p:txBody>
+          <a:bodyPr/>
+          <a:lstStyle>
+            <a:lvl1pPr>
+              <a:defRPr lang="en-US" sz="1400" b="1" kern="1200" cap="all" spc="150" baseline="0" dirty="0">
+                <a:solidFill>
+                  <a:schemeClr val="bg2">
+                    <a:lumMod val="50000"/>
+                  </a:schemeClr>
+                </a:solidFill>
+                <a:latin typeface="+mn-lt"/>
+                <a:ea typeface="Georgia" charset="0"/>
+                <a:cs typeface="Georgia" charset="0"/>
+              </a:defRPr>
+            </a:lvl1pPr>
+            <a:lvl2pPr marL="0" indent="0">
+              <a:buNone/>
+              <a:defRPr/>
+            </a:lvl2pPr>
+          </a:lstStyle>
+          <a:p>
+            <a:pPr marL="0" lvl="0" indent="0" algn="l" defTabSz="906199" rtl="0" eaLnBrk="1" latinLnBrk="0" hangingPunct="1">
+              <a:spcBef>
+                <a:spcPts val="0"/>
+              </a:spcBef>
+              <a:spcAft>
+                <a:spcPts val="800"/>
+              </a:spcAft>
+              <a:buClrTx/>
+              <a:buFont typeface="Calibri" panose="020F0502020204030204" pitchFamily="34" charset="0"/>
+              <a:buNone/>
+            </a:pPr>
+            <a:r>
+              <a:rPr lang="en-US" dirty="0"/>
+              <a:t>SECTION TAG</a:t>
+            </a:r>
+          </a:p>
+        </p:txBody>
+      </p:sp>
+      <p:sp>
+        <p:nvSpPr>
+          <p:cNvPr id="9" name="Footer Placeholder 3">
+            <a:extLst>
+              <a:ext uri="{FF2B5EF4-FFF2-40B4-BE49-F238E27FC236}">
+                <a16:creationId xmlns:a16="http://schemas.microsoft.com/office/drawing/2014/main" id="{6F2AC558-B54B-45F7-BAA8-41DA9DB79EBA}"/>
+              </a:ext>
+            </a:extLst>
+          </p:cNvPr>
+          <p:cNvSpPr>
+            <a:spLocks noGrp="1"/>
+          </p:cNvSpPr>
+          <p:nvPr>
+            <p:ph type="ftr" sz="quarter" idx="3"/>
+          </p:nvPr>
+        </p:nvSpPr>
+        <p:spPr>
+          <a:xfrm>
+            <a:off x="457200" y="6023777"/>
+            <a:ext cx="11277600" cy="365125"/>
+          </a:xfrm>
+          <a:prstGeom prst="rect">
+            <a:avLst/>
+          </a:prstGeom>
+        </p:spPr>
+        <p:txBody>
+          <a:bodyPr vert="horz" lIns="0" tIns="0" rIns="0" bIns="0" rtlCol="0" anchor="b"/>
+          <a:lstStyle>
+            <a:lvl1pPr algn="l">
+              <a:spcBef>
+                <a:spcPts val="0"/>
+              </a:spcBef>
+              <a:defRPr sz="800">
+                <a:solidFill>
+                  <a:schemeClr val="tx1"/>
+                </a:solidFill>
+              </a:defRPr>
+            </a:lvl1pPr>
+          </a:lstStyle>
+          <a:p>
+            <a:r>
+              <a:rPr lang="en-US"/>
+              <a:t>Base:</a:t>
+            </a:r>
+            <a:br>
+              <a:rPr lang="en-US"/>
+            </a:br>
+            <a:r>
+              <a:rPr lang="en-US"/>
+              <a:t>Q:</a:t>
+            </a:r>
+            <a:br>
+              <a:rPr lang="en-US"/>
+            </a:br>
+            <a:r>
+              <a:rPr lang="en-US"/>
+              <a:t>Note:</a:t>
+            </a:r>
+            <a:endParaRPr lang="en-US" dirty="0"/>
+          </a:p>
+        </p:txBody>
+      </p:sp>
+      <p:sp>
+        <p:nvSpPr>
+          <p:cNvPr id="11" name="Chart 2">
+            <a:extLst>
+              <a:ext uri="{FF2B5EF4-FFF2-40B4-BE49-F238E27FC236}">
+                <a16:creationId xmlns:a16="http://schemas.microsoft.com/office/drawing/2014/main" id="{B7883519-4BAC-B8BC-8444-2EEB98F51612}"/>
+              </a:ext>
+            </a:extLst>
+          </p:cNvPr>
+          <p:cNvSpPr>
+            <a:spLocks noGrp="1"/>
+          </p:cNvSpPr>
+          <p:nvPr>
+            <p:ph type="chart" sz="quarter" idx="18"/>
+          </p:nvPr>
+        </p:nvSpPr>
+        <p:spPr>
+          <a:xfrm>
+            <a:off x="8278368" y="974510"/>
+            <a:ext cx="3456432" cy="4887188"/>
+          </a:xfrm>
+          <a:prstGeom prst="rect">
+            <a:avLst/>
+          </a:prstGeom>
+        </p:spPr>
+        <p:txBody>
+          <a:bodyPr/>
+          <a:lstStyle/>
+          <a:p>
+            <a:endParaRPr lang="en-US" dirty="0"/>
+          </a:p>
+        </p:txBody>
+      </p:sp>
+    </p:spTree>
+    <p:custDataLst>
+      <p:tags r:id="rId1"/>
+    </p:custDataLst>
+    <p:extLst>
+      <p:ext uri="{BB962C8B-B14F-4D97-AF65-F5344CB8AC3E}">
+        <p14:creationId xmlns:p14="http://schemas.microsoft.com/office/powerpoint/2010/main" val="197841588"/>
+      </p:ext>
+    </p:extLst>
+  </p:cSld>
+  <p:clrMapOvr>
+    <a:masterClrMapping/>
+  </p:clrMapOvr>
+</p:sldLayout>
+</file>
+
+<file path=ppt/slideLayouts/slideLayout21.xml><?xml version="1.0" encoding="utf-8"?>
+<p:sldLayout xmlns:a="http://schemas.openxmlformats.org/drawingml/2006/main" xmlns:r="http://schemas.openxmlformats.org/officeDocument/2006/relationships" xmlns:p="http://schemas.openxmlformats.org/presentationml/2006/main" preserve="1" userDrawn="1">
   <p:cSld name="TT_3_Chart_&amp;_Text">
     <p:spTree>
       <p:nvGrpSpPr>
@@ -6702,7 +7009,7 @@
 </p:sldLayout>
 </file>
 
-<file path=ppt/slideLayouts/slideLayout21.xml><?xml version="1.0" encoding="utf-8"?>
+<file path=ppt/slideLayouts/slideLayout22.xml><?xml version="1.0" encoding="utf-8"?>
 <p:sldLayout xmlns:a="http://schemas.openxmlformats.org/drawingml/2006/main" xmlns:r="http://schemas.openxmlformats.org/officeDocument/2006/relationships" xmlns:p="http://schemas.openxmlformats.org/presentationml/2006/main" preserve="1" userDrawn="1">
   <p:cSld name="TT_3_Chart_Parent_Children">
     <p:spTree>
@@ -7001,7 +7308,7 @@
 </p:sldLayout>
 </file>
 
-<file path=ppt/slideLayouts/slideLayout22.xml><?xml version="1.0" encoding="utf-8"?>
+<file path=ppt/slideLayouts/slideLayout23.xml><?xml version="1.0" encoding="utf-8"?>
 <p:sldLayout xmlns:a="http://schemas.openxmlformats.org/drawingml/2006/main" xmlns:r="http://schemas.openxmlformats.org/officeDocument/2006/relationships" xmlns:p="http://schemas.openxmlformats.org/presentationml/2006/main" preserve="1" userDrawn="1">
   <p:cSld name="TT_Keytheme">
     <p:spTree>
@@ -7560,7 +7867,7 @@
 </p:sldLayout>
 </file>
 
-<file path=ppt/slideLayouts/slideLayout23.xml><?xml version="1.0" encoding="utf-8"?>
+<file path=ppt/slideLayouts/slideLayout24.xml><?xml version="1.0" encoding="utf-8"?>
 <p:sldLayout xmlns:a="http://schemas.openxmlformats.org/drawingml/2006/main" xmlns:r="http://schemas.openxmlformats.org/officeDocument/2006/relationships" xmlns:p="http://schemas.openxmlformats.org/presentationml/2006/main" preserve="1" userDrawn="1">
   <p:cSld name="TT_Keytheme_Solo_Chart">
     <p:spTree>
@@ -8000,7 +8307,7 @@
 </p:sldLayout>
 </file>
 
-<file path=ppt/slideLayouts/slideLayout24.xml><?xml version="1.0" encoding="utf-8"?>
+<file path=ppt/slideLayouts/slideLayout25.xml><?xml version="1.0" encoding="utf-8"?>
 <p:sldLayout xmlns:a="http://schemas.openxmlformats.org/drawingml/2006/main" xmlns:r="http://schemas.openxmlformats.org/officeDocument/2006/relationships" xmlns:p="http://schemas.openxmlformats.org/presentationml/2006/main" preserve="1" userDrawn="1">
   <p:cSld name="TT_Chart_Dashboard">
     <p:spTree>
@@ -8892,7 +9199,7 @@
 </p:sldLayout>
 </file>
 
-<file path=ppt/slideLayouts/slideLayout25.xml><?xml version="1.0" encoding="utf-8"?>
+<file path=ppt/slideLayouts/slideLayout26.xml><?xml version="1.0" encoding="utf-8"?>
 <p:sldLayout xmlns:a="http://schemas.openxmlformats.org/drawingml/2006/main" xmlns:r="http://schemas.openxmlformats.org/officeDocument/2006/relationships" xmlns:p="http://schemas.openxmlformats.org/presentationml/2006/main" preserve="1" userDrawn="1">
   <p:cSld name="TT_4x1_Chart">
     <p:spTree>
@@ -9232,7 +9539,7 @@
 </p:sldLayout>
 </file>
 
-<file path=ppt/slideLayouts/slideLayout26.xml><?xml version="1.0" encoding="utf-8"?>
+<file path=ppt/slideLayouts/slideLayout27.xml><?xml version="1.0" encoding="utf-8"?>
 <p:sldLayout xmlns:a="http://schemas.openxmlformats.org/drawingml/2006/main" xmlns:r="http://schemas.openxmlformats.org/officeDocument/2006/relationships" xmlns:p="http://schemas.openxmlformats.org/presentationml/2006/main" preserve="1" userDrawn="1">
   <p:cSld name="TT_2x2_Chart">
     <p:spTree>
@@ -9572,7 +9879,7 @@
 </p:sldLayout>
 </file>
 
-<file path=ppt/slideLayouts/slideLayout27.xml><?xml version="1.0" encoding="utf-8"?>
+<file path=ppt/slideLayouts/slideLayout28.xml><?xml version="1.0" encoding="utf-8"?>
 <p:sldLayout xmlns:a="http://schemas.openxmlformats.org/drawingml/2006/main" xmlns:r="http://schemas.openxmlformats.org/officeDocument/2006/relationships" xmlns:p="http://schemas.openxmlformats.org/presentationml/2006/main" preserve="1" userDrawn="1">
   <p:cSld name="TT_3_Chart_Vertical_Dashboard">
     <p:spTree>
@@ -10065,7 +10372,7 @@
 </p:sldLayout>
 </file>
 
-<file path=ppt/slideLayouts/slideLayout28.xml><?xml version="1.0" encoding="utf-8"?>
+<file path=ppt/slideLayouts/slideLayout29.xml><?xml version="1.0" encoding="utf-8"?>
 <p:sldLayout xmlns:a="http://schemas.openxmlformats.org/drawingml/2006/main" xmlns:r="http://schemas.openxmlformats.org/officeDocument/2006/relationships" xmlns:p="http://schemas.openxmlformats.org/presentationml/2006/main" preserve="1" userDrawn="1">
   <p:cSld name="TT_3_Chart_Dashboard_Flipped">
     <p:spTree>
@@ -10569,453 +10876,6 @@
     <p:extLst>
       <p:ext uri="{BB962C8B-B14F-4D97-AF65-F5344CB8AC3E}">
         <p14:creationId xmlns:p14="http://schemas.microsoft.com/office/powerpoint/2010/main" val="3782650534"/>
-      </p:ext>
-    </p:extLst>
-  </p:cSld>
-  <p:clrMapOvr>
-    <a:masterClrMapping/>
-  </p:clrMapOvr>
-</p:sldLayout>
-</file>
-
-<file path=ppt/slideLayouts/slideLayout29.xml><?xml version="1.0" encoding="utf-8"?>
-<p:sldLayout xmlns:a="http://schemas.openxmlformats.org/drawingml/2006/main" xmlns:r="http://schemas.openxmlformats.org/officeDocument/2006/relationships" xmlns:p="http://schemas.openxmlformats.org/presentationml/2006/main" preserve="1" userDrawn="1">
-  <p:cSld name="TT_Chart_w_Stat_Overlay">
-    <p:spTree>
-      <p:nvGrpSpPr>
-        <p:cNvPr id="1" name=""/>
-        <p:cNvGrpSpPr/>
-        <p:nvPr/>
-      </p:nvGrpSpPr>
-      <p:grpSpPr>
-        <a:xfrm>
-          <a:off x="0" y="0"/>
-          <a:ext cx="0" cy="0"/>
-          <a:chOff x="0" y="0"/>
-          <a:chExt cx="0" cy="0"/>
-        </a:xfrm>
-      </p:grpSpPr>
-      <p:sp>
-        <p:nvSpPr>
-          <p:cNvPr id="7" name="Chart 1"/>
-          <p:cNvSpPr>
-            <a:spLocks noGrp="1"/>
-          </p:cNvSpPr>
-          <p:nvPr>
-            <p:ph type="chart" sz="quarter" idx="14"/>
-          </p:nvPr>
-        </p:nvSpPr>
-        <p:spPr>
-          <a:xfrm>
-            <a:off x="3390900" y="939463"/>
-            <a:ext cx="8334847" cy="5449440"/>
-          </a:xfrm>
-          <a:prstGeom prst="rect">
-            <a:avLst/>
-          </a:prstGeom>
-        </p:spPr>
-        <p:txBody>
-          <a:bodyPr/>
-          <a:lstStyle/>
-          <a:p>
-            <a:endParaRPr lang="en-US" dirty="0"/>
-          </a:p>
-        </p:txBody>
-      </p:sp>
-      <p:sp>
-        <p:nvSpPr>
-          <p:cNvPr id="6" name="PPH-SlideNo"/>
-          <p:cNvSpPr>
-            <a:spLocks noGrp="1"/>
-          </p:cNvSpPr>
-          <p:nvPr>
-            <p:ph type="sldNum" sz="quarter" idx="4"/>
-          </p:nvPr>
-        </p:nvSpPr>
-        <p:spPr>
-          <a:xfrm>
-            <a:off x="10608148" y="6550981"/>
-            <a:ext cx="1117599" cy="230823"/>
-          </a:xfrm>
-          <a:prstGeom prst="rect">
-            <a:avLst/>
-          </a:prstGeom>
-        </p:spPr>
-        <p:txBody>
-          <a:bodyPr vert="horz" wrap="none" lIns="0" tIns="0" rIns="0" bIns="0" rtlCol="0" anchor="b"/>
-          <a:lstStyle>
-            <a:lvl1pPr algn="r">
-              <a:spcBef>
-                <a:spcPts val="0"/>
-              </a:spcBef>
-              <a:defRPr sz="800" b="1">
-                <a:solidFill>
-                  <a:schemeClr val="bg2">
-                    <a:lumMod val="50000"/>
-                  </a:schemeClr>
-                </a:solidFill>
-                <a:latin typeface="+mn-lt"/>
-              </a:defRPr>
-            </a:lvl1pPr>
-          </a:lstStyle>
-          <a:p>
-            <a:pPr defTabSz="856716"/>
-            <a:fld id="{7B6B1C32-E567-445C-9FD5-2A0B0A08DD29}" type="slidenum">
-              <a:rPr lang="en-US" smtClean="0"/>
-              <a:pPr defTabSz="856716"/>
-              <a:t>‹#›</a:t>
-            </a:fld>
-            <a:endParaRPr lang="en-US" dirty="0"/>
-          </a:p>
-        </p:txBody>
-      </p:sp>
-      <p:sp>
-        <p:nvSpPr>
-          <p:cNvPr id="10" name="Section Tag">
-            <a:extLst>
-              <a:ext uri="{FF2B5EF4-FFF2-40B4-BE49-F238E27FC236}">
-                <a16:creationId xmlns:a16="http://schemas.microsoft.com/office/drawing/2014/main" id="{862632C5-CE1F-4714-B8E6-9C62993BDD97}"/>
-              </a:ext>
-            </a:extLst>
-          </p:cNvPr>
-          <p:cNvSpPr>
-            <a:spLocks noGrp="1"/>
-          </p:cNvSpPr>
-          <p:nvPr>
-            <p:ph type="body" sz="quarter" idx="16" hasCustomPrompt="1"/>
-          </p:nvPr>
-        </p:nvSpPr>
-        <p:spPr>
-          <a:xfrm>
-            <a:off x="457200" y="425325"/>
-            <a:ext cx="8343146" cy="298952"/>
-          </a:xfrm>
-          <a:prstGeom prst="rect">
-            <a:avLst/>
-          </a:prstGeom>
-        </p:spPr>
-        <p:txBody>
-          <a:bodyPr/>
-          <a:lstStyle>
-            <a:lvl1pPr>
-              <a:defRPr lang="en-US" sz="1400" b="1" kern="1200" cap="all" spc="150" baseline="0" dirty="0">
-                <a:solidFill>
-                  <a:schemeClr val="bg2">
-                    <a:lumMod val="50000"/>
-                  </a:schemeClr>
-                </a:solidFill>
-                <a:latin typeface="+mn-lt"/>
-                <a:ea typeface="Georgia" charset="0"/>
-                <a:cs typeface="Georgia" charset="0"/>
-              </a:defRPr>
-            </a:lvl1pPr>
-            <a:lvl2pPr marL="0" indent="0">
-              <a:buNone/>
-              <a:defRPr/>
-            </a:lvl2pPr>
-          </a:lstStyle>
-          <a:p>
-            <a:pPr marL="0" lvl="0" indent="0" algn="l" defTabSz="906199" rtl="0" eaLnBrk="1" latinLnBrk="0" hangingPunct="1">
-              <a:spcBef>
-                <a:spcPts val="0"/>
-              </a:spcBef>
-              <a:spcAft>
-                <a:spcPts val="800"/>
-              </a:spcAft>
-              <a:buClrTx/>
-              <a:buFont typeface="Calibri" panose="020F0502020204030204" pitchFamily="34" charset="0"/>
-              <a:buNone/>
-            </a:pPr>
-            <a:r>
-              <a:rPr lang="en-US" dirty="0"/>
-              <a:t>SECTION TAG</a:t>
-            </a:r>
-          </a:p>
-        </p:txBody>
-      </p:sp>
-      <p:sp>
-        <p:nvSpPr>
-          <p:cNvPr id="12" name="Stat">
-            <a:extLst>
-              <a:ext uri="{FF2B5EF4-FFF2-40B4-BE49-F238E27FC236}">
-                <a16:creationId xmlns:a16="http://schemas.microsoft.com/office/drawing/2014/main" id="{13F60154-60CF-40B7-954A-2B72931DBA54}"/>
-              </a:ext>
-            </a:extLst>
-          </p:cNvPr>
-          <p:cNvSpPr>
-            <a:spLocks noGrp="1"/>
-          </p:cNvSpPr>
-          <p:nvPr>
-            <p:ph type="body" sz="quarter" idx="20" hasCustomPrompt="1"/>
-          </p:nvPr>
-        </p:nvSpPr>
-        <p:spPr>
-          <a:xfrm>
-            <a:off x="3390900" y="939462"/>
-            <a:ext cx="2466366" cy="2485756"/>
-          </a:xfrm>
-          <a:prstGeom prst="rect">
-            <a:avLst/>
-          </a:prstGeom>
-        </p:spPr>
-        <p:txBody>
-          <a:bodyPr anchor="ctr"/>
-          <a:lstStyle>
-            <a:lvl1pPr>
-              <a:spcAft>
-                <a:spcPts val="0"/>
-              </a:spcAft>
-              <a:defRPr sz="2400" b="1"/>
-            </a:lvl1pPr>
-            <a:lvl2pPr marL="0" indent="0">
-              <a:buNone/>
-              <a:defRPr/>
-            </a:lvl2pPr>
-            <a:lvl3pPr marL="0" indent="0">
-              <a:defRPr lang="en-US" sz="900" kern="1200" dirty="0">
-                <a:solidFill>
-                  <a:schemeClr val="bg2">
-                    <a:lumMod val="50000"/>
-                  </a:schemeClr>
-                </a:solidFill>
-                <a:latin typeface="+mn-lt"/>
-                <a:ea typeface="+mn-ea"/>
-                <a:cs typeface="+mn-cs"/>
-              </a:defRPr>
-            </a:lvl3pPr>
-            <a:lvl6pPr>
-              <a:defRPr sz="900">
-                <a:solidFill>
-                  <a:schemeClr val="bg2">
-                    <a:lumMod val="50000"/>
-                  </a:schemeClr>
-                </a:solidFill>
-              </a:defRPr>
-            </a:lvl6pPr>
-          </a:lstStyle>
-          <a:p>
-            <a:pPr lvl="0"/>
-            <a:r>
-              <a:rPr lang="en-US" dirty="0"/>
-              <a:t>Stat</a:t>
-            </a:r>
-          </a:p>
-          <a:p>
-            <a:pPr lvl="1"/>
-            <a:r>
-              <a:rPr lang="en-US" dirty="0"/>
-              <a:t>Info</a:t>
-            </a:r>
-          </a:p>
-          <a:p>
-            <a:pPr marL="0" lvl="5" indent="0" algn="l" defTabSz="906199" rtl="0" eaLnBrk="1" latinLnBrk="0" hangingPunct="1">
-              <a:spcBef>
-                <a:spcPts val="0"/>
-              </a:spcBef>
-              <a:spcAft>
-                <a:spcPts val="600"/>
-              </a:spcAft>
-              <a:buFont typeface="Arial" panose="020B0604020202020204" pitchFamily="34" charset="0"/>
-              <a:buNone/>
-            </a:pPr>
-            <a:r>
-              <a:rPr lang="en-US" dirty="0"/>
-              <a:t>Detail</a:t>
-            </a:r>
-          </a:p>
-        </p:txBody>
-      </p:sp>
-      <p:sp>
-        <p:nvSpPr>
-          <p:cNvPr id="14" name="Footer Placeholder 3">
-            <a:extLst>
-              <a:ext uri="{FF2B5EF4-FFF2-40B4-BE49-F238E27FC236}">
-                <a16:creationId xmlns:a16="http://schemas.microsoft.com/office/drawing/2014/main" id="{5707E05C-76DA-47A5-9567-0114AAA6E025}"/>
-              </a:ext>
-            </a:extLst>
-          </p:cNvPr>
-          <p:cNvSpPr>
-            <a:spLocks noGrp="1"/>
-          </p:cNvSpPr>
-          <p:nvPr>
-            <p:ph type="ftr" sz="quarter" idx="3"/>
-          </p:nvPr>
-        </p:nvSpPr>
-        <p:spPr>
-          <a:xfrm>
-            <a:off x="457200" y="6023777"/>
-            <a:ext cx="2476500" cy="365125"/>
-          </a:xfrm>
-          <a:prstGeom prst="rect">
-            <a:avLst/>
-          </a:prstGeom>
-        </p:spPr>
-        <p:txBody>
-          <a:bodyPr vert="horz" lIns="0" tIns="0" rIns="0" bIns="0" rtlCol="0" anchor="b"/>
-          <a:lstStyle>
-            <a:lvl1pPr algn="l">
-              <a:spcBef>
-                <a:spcPts val="0"/>
-              </a:spcBef>
-              <a:defRPr sz="800">
-                <a:solidFill>
-                  <a:schemeClr val="tx1"/>
-                </a:solidFill>
-              </a:defRPr>
-            </a:lvl1pPr>
-          </a:lstStyle>
-          <a:p>
-            <a:r>
-              <a:rPr lang="en-US"/>
-              <a:t>Base:</a:t>
-            </a:r>
-            <a:br>
-              <a:rPr lang="en-US"/>
-            </a:br>
-            <a:r>
-              <a:rPr lang="en-US"/>
-              <a:t>Q:</a:t>
-            </a:r>
-            <a:br>
-              <a:rPr lang="en-US"/>
-            </a:br>
-            <a:r>
-              <a:rPr lang="en-US"/>
-              <a:t>Note:</a:t>
-            </a:r>
-            <a:endParaRPr lang="en-US" dirty="0"/>
-          </a:p>
-        </p:txBody>
-      </p:sp>
-      <p:sp>
-        <p:nvSpPr>
-          <p:cNvPr id="5" name="BodyCopy 1">
-            <a:extLst>
-              <a:ext uri="{FF2B5EF4-FFF2-40B4-BE49-F238E27FC236}">
-                <a16:creationId xmlns:a16="http://schemas.microsoft.com/office/drawing/2014/main" id="{C89510E8-F111-4A05-BDF9-6F1766BE7785}"/>
-              </a:ext>
-            </a:extLst>
-          </p:cNvPr>
-          <p:cNvSpPr>
-            <a:spLocks noGrp="1"/>
-          </p:cNvSpPr>
-          <p:nvPr>
-            <p:ph type="body" sz="quarter" idx="22"/>
-          </p:nvPr>
-        </p:nvSpPr>
-        <p:spPr>
-          <a:xfrm>
-            <a:off x="457201" y="951101"/>
-            <a:ext cx="2466364" cy="4879331"/>
-          </a:xfrm>
-          <a:prstGeom prst="rect">
-            <a:avLst/>
-          </a:prstGeom>
-        </p:spPr>
-        <p:txBody>
-          <a:bodyPr anchor="ctr"/>
-          <a:lstStyle>
-            <a:lvl1pPr>
-              <a:defRPr sz="1800"/>
-            </a:lvl1pPr>
-            <a:lvl2pPr marL="0" indent="0">
-              <a:buNone/>
-              <a:defRPr sz="1100"/>
-            </a:lvl2pPr>
-            <a:lvl3pPr marL="173038" indent="-173038">
-              <a:buClr>
-                <a:schemeClr val="bg2">
-                  <a:lumMod val="50000"/>
-                </a:schemeClr>
-              </a:buClr>
-              <a:buFont typeface="Arial" panose="020B0604020202020204" pitchFamily="34" charset="0"/>
-              <a:buChar char="●"/>
-              <a:defRPr sz="1100" b="0"/>
-            </a:lvl3pPr>
-            <a:lvl4pPr marL="344488" indent="-171450">
-              <a:defRPr sz="1100"/>
-            </a:lvl4pPr>
-            <a:lvl5pPr marL="0" indent="0">
-              <a:buNone/>
-              <a:defRPr sz="1100" i="1">
-                <a:solidFill>
-                  <a:schemeClr val="accent1"/>
-                </a:solidFill>
-              </a:defRPr>
-            </a:lvl5pPr>
-            <a:lvl6pPr marL="0" indent="0">
-              <a:defRPr lang="en-US" sz="900" kern="1200" dirty="0">
-                <a:solidFill>
-                  <a:schemeClr val="bg2">
-                    <a:lumMod val="50000"/>
-                  </a:schemeClr>
-                </a:solidFill>
-                <a:latin typeface="+mn-lt"/>
-                <a:ea typeface="+mn-ea"/>
-                <a:cs typeface="+mn-cs"/>
-              </a:defRPr>
-            </a:lvl6pPr>
-          </a:lstStyle>
-          <a:p>
-            <a:pPr lvl="0"/>
-            <a:r>
-              <a:rPr lang="en-US" dirty="0"/>
-              <a:t>Click to edit Master text styles</a:t>
-            </a:r>
-          </a:p>
-          <a:p>
-            <a:pPr lvl="1"/>
-            <a:r>
-              <a:rPr lang="en-US" dirty="0"/>
-              <a:t>Second level</a:t>
-            </a:r>
-          </a:p>
-          <a:p>
-            <a:pPr lvl="2"/>
-            <a:r>
-              <a:rPr lang="en-US" dirty="0"/>
-              <a:t>Third level</a:t>
-            </a:r>
-          </a:p>
-          <a:p>
-            <a:pPr lvl="3"/>
-            <a:r>
-              <a:rPr lang="en-US" dirty="0"/>
-              <a:t>Fourth level</a:t>
-            </a:r>
-          </a:p>
-          <a:p>
-            <a:pPr lvl="4"/>
-            <a:r>
-              <a:rPr lang="en-US" dirty="0"/>
-              <a:t>Fifth level</a:t>
-            </a:r>
-          </a:p>
-          <a:p>
-            <a:pPr marL="0" lvl="5" indent="0" algn="l" defTabSz="906199" rtl="0" eaLnBrk="1" latinLnBrk="0" hangingPunct="1">
-              <a:spcBef>
-                <a:spcPts val="0"/>
-              </a:spcBef>
-              <a:spcAft>
-                <a:spcPts val="600"/>
-              </a:spcAft>
-              <a:buFont typeface="Arial" panose="020B0604020202020204" pitchFamily="34" charset="0"/>
-              <a:buNone/>
-            </a:pPr>
-            <a:r>
-              <a:rPr lang="en-US" dirty="0"/>
-              <a:t>Sixth level</a:t>
-            </a:r>
-          </a:p>
-        </p:txBody>
-      </p:sp>
-    </p:spTree>
-    <p:custDataLst>
-      <p:tags r:id="rId1"/>
-    </p:custDataLst>
-    <p:extLst>
-      <p:ext uri="{BB962C8B-B14F-4D97-AF65-F5344CB8AC3E}">
-        <p14:creationId xmlns:p14="http://schemas.microsoft.com/office/powerpoint/2010/main" val="2868288065"/>
       </p:ext>
     </p:extLst>
   </p:cSld>
@@ -11892,7 +11752,7 @@
 
 <file path=ppt/slideLayouts/slideLayout30.xml><?xml version="1.0" encoding="utf-8"?>
 <p:sldLayout xmlns:a="http://schemas.openxmlformats.org/drawingml/2006/main" xmlns:r="http://schemas.openxmlformats.org/officeDocument/2006/relationships" xmlns:p="http://schemas.openxmlformats.org/presentationml/2006/main" preserve="1" userDrawn="1">
-  <p:cSld name="TT_4_Chart_&amp;_Text">
+  <p:cSld name="TT_Chart_w_Stat_Overlay">
     <p:spTree>
       <p:nvGrpSpPr>
         <p:cNvPr id="1" name=""/>
@@ -11909,10 +11769,240 @@
       </p:grpSpPr>
       <p:sp>
         <p:nvSpPr>
-          <p:cNvPr id="11" name="Footer Placeholder 3">
-            <a:extLst>
-              <a:ext uri="{FF2B5EF4-FFF2-40B4-BE49-F238E27FC236}">
-                <a16:creationId xmlns:a16="http://schemas.microsoft.com/office/drawing/2014/main" id="{DAE038C8-495A-46D3-AE0C-462D123EB0CC}"/>
+          <p:cNvPr id="7" name="Chart 1"/>
+          <p:cNvSpPr>
+            <a:spLocks noGrp="1"/>
+          </p:cNvSpPr>
+          <p:nvPr>
+            <p:ph type="chart" sz="quarter" idx="14"/>
+          </p:nvPr>
+        </p:nvSpPr>
+        <p:spPr>
+          <a:xfrm>
+            <a:off x="3390900" y="939463"/>
+            <a:ext cx="8334847" cy="5449440"/>
+          </a:xfrm>
+          <a:prstGeom prst="rect">
+            <a:avLst/>
+          </a:prstGeom>
+        </p:spPr>
+        <p:txBody>
+          <a:bodyPr/>
+          <a:lstStyle/>
+          <a:p>
+            <a:endParaRPr lang="en-US" dirty="0"/>
+          </a:p>
+        </p:txBody>
+      </p:sp>
+      <p:sp>
+        <p:nvSpPr>
+          <p:cNvPr id="6" name="PPH-SlideNo"/>
+          <p:cNvSpPr>
+            <a:spLocks noGrp="1"/>
+          </p:cNvSpPr>
+          <p:nvPr>
+            <p:ph type="sldNum" sz="quarter" idx="4"/>
+          </p:nvPr>
+        </p:nvSpPr>
+        <p:spPr>
+          <a:xfrm>
+            <a:off x="10608148" y="6550981"/>
+            <a:ext cx="1117599" cy="230823"/>
+          </a:xfrm>
+          <a:prstGeom prst="rect">
+            <a:avLst/>
+          </a:prstGeom>
+        </p:spPr>
+        <p:txBody>
+          <a:bodyPr vert="horz" wrap="none" lIns="0" tIns="0" rIns="0" bIns="0" rtlCol="0" anchor="b"/>
+          <a:lstStyle>
+            <a:lvl1pPr algn="r">
+              <a:spcBef>
+                <a:spcPts val="0"/>
+              </a:spcBef>
+              <a:defRPr sz="800" b="1">
+                <a:solidFill>
+                  <a:schemeClr val="bg2">
+                    <a:lumMod val="50000"/>
+                  </a:schemeClr>
+                </a:solidFill>
+                <a:latin typeface="+mn-lt"/>
+              </a:defRPr>
+            </a:lvl1pPr>
+          </a:lstStyle>
+          <a:p>
+            <a:pPr defTabSz="856716"/>
+            <a:fld id="{7B6B1C32-E567-445C-9FD5-2A0B0A08DD29}" type="slidenum">
+              <a:rPr lang="en-US" smtClean="0"/>
+              <a:pPr defTabSz="856716"/>
+              <a:t>‹#›</a:t>
+            </a:fld>
+            <a:endParaRPr lang="en-US" dirty="0"/>
+          </a:p>
+        </p:txBody>
+      </p:sp>
+      <p:sp>
+        <p:nvSpPr>
+          <p:cNvPr id="10" name="Section Tag">
+            <a:extLst>
+              <a:ext uri="{FF2B5EF4-FFF2-40B4-BE49-F238E27FC236}">
+                <a16:creationId xmlns:a16="http://schemas.microsoft.com/office/drawing/2014/main" id="{862632C5-CE1F-4714-B8E6-9C62993BDD97}"/>
+              </a:ext>
+            </a:extLst>
+          </p:cNvPr>
+          <p:cNvSpPr>
+            <a:spLocks noGrp="1"/>
+          </p:cNvSpPr>
+          <p:nvPr>
+            <p:ph type="body" sz="quarter" idx="16" hasCustomPrompt="1"/>
+          </p:nvPr>
+        </p:nvSpPr>
+        <p:spPr>
+          <a:xfrm>
+            <a:off x="457200" y="425325"/>
+            <a:ext cx="8343146" cy="298952"/>
+          </a:xfrm>
+          <a:prstGeom prst="rect">
+            <a:avLst/>
+          </a:prstGeom>
+        </p:spPr>
+        <p:txBody>
+          <a:bodyPr/>
+          <a:lstStyle>
+            <a:lvl1pPr>
+              <a:defRPr lang="en-US" sz="1400" b="1" kern="1200" cap="all" spc="150" baseline="0" dirty="0">
+                <a:solidFill>
+                  <a:schemeClr val="bg2">
+                    <a:lumMod val="50000"/>
+                  </a:schemeClr>
+                </a:solidFill>
+                <a:latin typeface="+mn-lt"/>
+                <a:ea typeface="Georgia" charset="0"/>
+                <a:cs typeface="Georgia" charset="0"/>
+              </a:defRPr>
+            </a:lvl1pPr>
+            <a:lvl2pPr marL="0" indent="0">
+              <a:buNone/>
+              <a:defRPr/>
+            </a:lvl2pPr>
+          </a:lstStyle>
+          <a:p>
+            <a:pPr marL="0" lvl="0" indent="0" algn="l" defTabSz="906199" rtl="0" eaLnBrk="1" latinLnBrk="0" hangingPunct="1">
+              <a:spcBef>
+                <a:spcPts val="0"/>
+              </a:spcBef>
+              <a:spcAft>
+                <a:spcPts val="800"/>
+              </a:spcAft>
+              <a:buClrTx/>
+              <a:buFont typeface="Calibri" panose="020F0502020204030204" pitchFamily="34" charset="0"/>
+              <a:buNone/>
+            </a:pPr>
+            <a:r>
+              <a:rPr lang="en-US" dirty="0"/>
+              <a:t>SECTION TAG</a:t>
+            </a:r>
+          </a:p>
+        </p:txBody>
+      </p:sp>
+      <p:sp>
+        <p:nvSpPr>
+          <p:cNvPr id="12" name="Stat">
+            <a:extLst>
+              <a:ext uri="{FF2B5EF4-FFF2-40B4-BE49-F238E27FC236}">
+                <a16:creationId xmlns:a16="http://schemas.microsoft.com/office/drawing/2014/main" id="{13F60154-60CF-40B7-954A-2B72931DBA54}"/>
+              </a:ext>
+            </a:extLst>
+          </p:cNvPr>
+          <p:cNvSpPr>
+            <a:spLocks noGrp="1"/>
+          </p:cNvSpPr>
+          <p:nvPr>
+            <p:ph type="body" sz="quarter" idx="20" hasCustomPrompt="1"/>
+          </p:nvPr>
+        </p:nvSpPr>
+        <p:spPr>
+          <a:xfrm>
+            <a:off x="3390900" y="939462"/>
+            <a:ext cx="2466366" cy="2485756"/>
+          </a:xfrm>
+          <a:prstGeom prst="rect">
+            <a:avLst/>
+          </a:prstGeom>
+        </p:spPr>
+        <p:txBody>
+          <a:bodyPr anchor="ctr"/>
+          <a:lstStyle>
+            <a:lvl1pPr>
+              <a:spcAft>
+                <a:spcPts val="0"/>
+              </a:spcAft>
+              <a:defRPr sz="2400" b="1"/>
+            </a:lvl1pPr>
+            <a:lvl2pPr marL="0" indent="0">
+              <a:buNone/>
+              <a:defRPr/>
+            </a:lvl2pPr>
+            <a:lvl3pPr marL="0" indent="0">
+              <a:defRPr lang="en-US" sz="900" kern="1200" dirty="0">
+                <a:solidFill>
+                  <a:schemeClr val="bg2">
+                    <a:lumMod val="50000"/>
+                  </a:schemeClr>
+                </a:solidFill>
+                <a:latin typeface="+mn-lt"/>
+                <a:ea typeface="+mn-ea"/>
+                <a:cs typeface="+mn-cs"/>
+              </a:defRPr>
+            </a:lvl3pPr>
+            <a:lvl6pPr>
+              <a:defRPr sz="900">
+                <a:solidFill>
+                  <a:schemeClr val="bg2">
+                    <a:lumMod val="50000"/>
+                  </a:schemeClr>
+                </a:solidFill>
+              </a:defRPr>
+            </a:lvl6pPr>
+          </a:lstStyle>
+          <a:p>
+            <a:pPr lvl="0"/>
+            <a:r>
+              <a:rPr lang="en-US" dirty="0"/>
+              <a:t>Stat</a:t>
+            </a:r>
+          </a:p>
+          <a:p>
+            <a:pPr lvl="1"/>
+            <a:r>
+              <a:rPr lang="en-US" dirty="0"/>
+              <a:t>Info</a:t>
+            </a:r>
+          </a:p>
+          <a:p>
+            <a:pPr marL="0" lvl="5" indent="0" algn="l" defTabSz="906199" rtl="0" eaLnBrk="1" latinLnBrk="0" hangingPunct="1">
+              <a:spcBef>
+                <a:spcPts val="0"/>
+              </a:spcBef>
+              <a:spcAft>
+                <a:spcPts val="600"/>
+              </a:spcAft>
+              <a:buFont typeface="Arial" panose="020B0604020202020204" pitchFamily="34" charset="0"/>
+              <a:buNone/>
+            </a:pPr>
+            <a:r>
+              <a:rPr lang="en-US" dirty="0"/>
+              <a:t>Detail</a:t>
+            </a:r>
+          </a:p>
+        </p:txBody>
+      </p:sp>
+      <p:sp>
+        <p:nvSpPr>
+          <p:cNvPr id="14" name="Footer Placeholder 3">
+            <a:extLst>
+              <a:ext uri="{FF2B5EF4-FFF2-40B4-BE49-F238E27FC236}">
+                <a16:creationId xmlns:a16="http://schemas.microsoft.com/office/drawing/2014/main" id="{5707E05C-76DA-47A5-9567-0114AAA6E025}"/>
               </a:ext>
             </a:extLst>
           </p:cNvPr>
@@ -11971,253 +12061,10 @@
       </p:sp>
       <p:sp>
         <p:nvSpPr>
-          <p:cNvPr id="6" name="PPH-SlideNo"/>
-          <p:cNvSpPr>
-            <a:spLocks noGrp="1"/>
-          </p:cNvSpPr>
-          <p:nvPr>
-            <p:ph type="sldNum" sz="quarter" idx="4"/>
-          </p:nvPr>
-        </p:nvSpPr>
-        <p:spPr>
-          <a:xfrm>
-            <a:off x="10608148" y="6550981"/>
-            <a:ext cx="1117599" cy="230823"/>
-          </a:xfrm>
-          <a:prstGeom prst="rect">
-            <a:avLst/>
-          </a:prstGeom>
-        </p:spPr>
-        <p:txBody>
-          <a:bodyPr vert="horz" wrap="none" lIns="0" tIns="0" rIns="0" bIns="0" rtlCol="0" anchor="b"/>
-          <a:lstStyle>
-            <a:lvl1pPr algn="r">
-              <a:spcBef>
-                <a:spcPts val="0"/>
-              </a:spcBef>
-              <a:defRPr sz="800" b="1">
-                <a:solidFill>
-                  <a:schemeClr val="bg2">
-                    <a:lumMod val="50000"/>
-                  </a:schemeClr>
-                </a:solidFill>
-                <a:latin typeface="+mn-lt"/>
-              </a:defRPr>
-            </a:lvl1pPr>
-          </a:lstStyle>
-          <a:p>
-            <a:pPr defTabSz="856716"/>
-            <a:fld id="{7B6B1C32-E567-445C-9FD5-2A0B0A08DD29}" type="slidenum">
-              <a:rPr lang="en-US" smtClean="0"/>
-              <a:pPr defTabSz="856716"/>
-              <a:t>‹#›</a:t>
-            </a:fld>
-            <a:endParaRPr lang="en-US" dirty="0"/>
-          </a:p>
-        </p:txBody>
-      </p:sp>
-      <p:sp>
-        <p:nvSpPr>
-          <p:cNvPr id="10" name="Section Tag">
-            <a:extLst>
-              <a:ext uri="{FF2B5EF4-FFF2-40B4-BE49-F238E27FC236}">
-                <a16:creationId xmlns:a16="http://schemas.microsoft.com/office/drawing/2014/main" id="{862632C5-CE1F-4714-B8E6-9C62993BDD97}"/>
-              </a:ext>
-            </a:extLst>
-          </p:cNvPr>
-          <p:cNvSpPr>
-            <a:spLocks noGrp="1"/>
-          </p:cNvSpPr>
-          <p:nvPr>
-            <p:ph type="body" sz="quarter" idx="16" hasCustomPrompt="1"/>
-          </p:nvPr>
-        </p:nvSpPr>
-        <p:spPr>
-          <a:xfrm>
-            <a:off x="457200" y="425325"/>
-            <a:ext cx="8343146" cy="298952"/>
-          </a:xfrm>
-          <a:prstGeom prst="rect">
-            <a:avLst/>
-          </a:prstGeom>
-        </p:spPr>
-        <p:txBody>
-          <a:bodyPr/>
-          <a:lstStyle>
-            <a:lvl1pPr>
-              <a:defRPr lang="en-US" sz="1400" b="1" kern="1200" cap="all" spc="150" baseline="0" dirty="0">
-                <a:solidFill>
-                  <a:schemeClr val="bg2">
-                    <a:lumMod val="50000"/>
-                  </a:schemeClr>
-                </a:solidFill>
-                <a:latin typeface="+mn-lt"/>
-                <a:ea typeface="Georgia" charset="0"/>
-                <a:cs typeface="Georgia" charset="0"/>
-              </a:defRPr>
-            </a:lvl1pPr>
-            <a:lvl2pPr marL="0" indent="0">
-              <a:buNone/>
-              <a:defRPr/>
-            </a:lvl2pPr>
-          </a:lstStyle>
-          <a:p>
-            <a:pPr marL="0" lvl="0" indent="0" algn="l" defTabSz="906199" rtl="0" eaLnBrk="1" latinLnBrk="0" hangingPunct="1">
-              <a:spcBef>
-                <a:spcPts val="0"/>
-              </a:spcBef>
-              <a:spcAft>
-                <a:spcPts val="800"/>
-              </a:spcAft>
-              <a:buClrTx/>
-              <a:buFont typeface="Calibri" panose="020F0502020204030204" pitchFamily="34" charset="0"/>
-              <a:buNone/>
-            </a:pPr>
-            <a:r>
-              <a:rPr lang="en-US" dirty="0"/>
-              <a:t>SECTION TAG</a:t>
-            </a:r>
-          </a:p>
-        </p:txBody>
-      </p:sp>
-      <p:sp>
-        <p:nvSpPr>
-          <p:cNvPr id="16" name="Chart 5">
-            <a:extLst>
-              <a:ext uri="{FF2B5EF4-FFF2-40B4-BE49-F238E27FC236}">
-                <a16:creationId xmlns:a16="http://schemas.microsoft.com/office/drawing/2014/main" id="{8DA1412E-5833-4015-AAA2-0C72380BBCFE}"/>
-              </a:ext>
-            </a:extLst>
-          </p:cNvPr>
-          <p:cNvSpPr>
-            <a:spLocks noGrp="1"/>
-          </p:cNvSpPr>
-          <p:nvPr>
-            <p:ph type="chart" sz="quarter" idx="24"/>
-          </p:nvPr>
-        </p:nvSpPr>
-        <p:spPr>
-          <a:xfrm>
-            <a:off x="3390900" y="951101"/>
-            <a:ext cx="3950615" cy="2503087"/>
-          </a:xfrm>
-          <a:prstGeom prst="rect">
-            <a:avLst/>
-          </a:prstGeom>
-        </p:spPr>
-        <p:txBody>
-          <a:bodyPr/>
-          <a:lstStyle/>
-          <a:p>
-            <a:endParaRPr lang="en-US" dirty="0"/>
-          </a:p>
-        </p:txBody>
-      </p:sp>
-      <p:sp>
-        <p:nvSpPr>
-          <p:cNvPr id="15" name="Chart 4">
-            <a:extLst>
-              <a:ext uri="{FF2B5EF4-FFF2-40B4-BE49-F238E27FC236}">
-                <a16:creationId xmlns:a16="http://schemas.microsoft.com/office/drawing/2014/main" id="{4564C230-395F-4C21-8193-F363F3D023EF}"/>
-              </a:ext>
-            </a:extLst>
-          </p:cNvPr>
-          <p:cNvSpPr>
-            <a:spLocks noGrp="1"/>
-          </p:cNvSpPr>
-          <p:nvPr>
-            <p:ph type="chart" sz="quarter" idx="23"/>
-          </p:nvPr>
-        </p:nvSpPr>
-        <p:spPr>
-          <a:xfrm>
-            <a:off x="7775539" y="962973"/>
-            <a:ext cx="3950208" cy="2503087"/>
-          </a:xfrm>
-          <a:prstGeom prst="rect">
-            <a:avLst/>
-          </a:prstGeom>
-        </p:spPr>
-        <p:txBody>
-          <a:bodyPr/>
-          <a:lstStyle/>
-          <a:p>
-            <a:endParaRPr lang="en-US" dirty="0"/>
-          </a:p>
-        </p:txBody>
-      </p:sp>
-      <p:sp>
-        <p:nvSpPr>
-          <p:cNvPr id="12" name="Chart 2">
-            <a:extLst>
-              <a:ext uri="{FF2B5EF4-FFF2-40B4-BE49-F238E27FC236}">
-                <a16:creationId xmlns:a16="http://schemas.microsoft.com/office/drawing/2014/main" id="{360FEB04-7853-4575-85C5-0B6E6F0C8384}"/>
-              </a:ext>
-            </a:extLst>
-          </p:cNvPr>
-          <p:cNvSpPr>
-            <a:spLocks noGrp="1"/>
-          </p:cNvSpPr>
-          <p:nvPr>
-            <p:ph type="chart" sz="quarter" idx="19"/>
-          </p:nvPr>
-        </p:nvSpPr>
-        <p:spPr>
-          <a:xfrm>
-            <a:off x="3391307" y="3911388"/>
-            <a:ext cx="3950208" cy="2477514"/>
-          </a:xfrm>
-          <a:prstGeom prst="rect">
-            <a:avLst/>
-          </a:prstGeom>
-        </p:spPr>
-        <p:txBody>
-          <a:bodyPr/>
-          <a:lstStyle/>
-          <a:p>
-            <a:endParaRPr lang="en-US" dirty="0"/>
-          </a:p>
-        </p:txBody>
-      </p:sp>
-      <p:sp>
-        <p:nvSpPr>
-          <p:cNvPr id="9" name="Chart 1">
-            <a:extLst>
-              <a:ext uri="{FF2B5EF4-FFF2-40B4-BE49-F238E27FC236}">
-                <a16:creationId xmlns:a16="http://schemas.microsoft.com/office/drawing/2014/main" id="{F4A6D268-AFCF-4422-BA46-0325498708B6}"/>
-              </a:ext>
-            </a:extLst>
-          </p:cNvPr>
-          <p:cNvSpPr>
-            <a:spLocks noGrp="1"/>
-          </p:cNvSpPr>
-          <p:nvPr>
-            <p:ph type="chart" sz="quarter" idx="17"/>
-          </p:nvPr>
-        </p:nvSpPr>
-        <p:spPr>
-          <a:xfrm>
-            <a:off x="7775539" y="3923286"/>
-            <a:ext cx="3950208" cy="2477514"/>
-          </a:xfrm>
-          <a:prstGeom prst="rect">
-            <a:avLst/>
-          </a:prstGeom>
-        </p:spPr>
-        <p:txBody>
-          <a:bodyPr/>
-          <a:lstStyle/>
-          <a:p>
-            <a:endParaRPr lang="en-US" dirty="0"/>
-          </a:p>
-        </p:txBody>
-      </p:sp>
-      <p:sp>
-        <p:nvSpPr>
-          <p:cNvPr id="18" name="BodyCopy 1">
-            <a:extLst>
-              <a:ext uri="{FF2B5EF4-FFF2-40B4-BE49-F238E27FC236}">
-                <a16:creationId xmlns:a16="http://schemas.microsoft.com/office/drawing/2014/main" id="{BDC876CF-887F-4124-863C-6624C88B7E36}"/>
+          <p:cNvPr id="5" name="BodyCopy 1">
+            <a:extLst>
+              <a:ext uri="{FF2B5EF4-FFF2-40B4-BE49-F238E27FC236}">
+                <a16:creationId xmlns:a16="http://schemas.microsoft.com/office/drawing/2014/main" id="{C89510E8-F111-4A05-BDF9-6F1766BE7785}"/>
               </a:ext>
             </a:extLst>
           </p:cNvPr>
@@ -12340,6 +12187,466 @@
     </p:custDataLst>
     <p:extLst>
       <p:ext uri="{BB962C8B-B14F-4D97-AF65-F5344CB8AC3E}">
+        <p14:creationId xmlns:p14="http://schemas.microsoft.com/office/powerpoint/2010/main" val="2868288065"/>
+      </p:ext>
+    </p:extLst>
+  </p:cSld>
+  <p:clrMapOvr>
+    <a:masterClrMapping/>
+  </p:clrMapOvr>
+</p:sldLayout>
+</file>
+
+<file path=ppt/slideLayouts/slideLayout31.xml><?xml version="1.0" encoding="utf-8"?>
+<p:sldLayout xmlns:a="http://schemas.openxmlformats.org/drawingml/2006/main" xmlns:r="http://schemas.openxmlformats.org/officeDocument/2006/relationships" xmlns:p="http://schemas.openxmlformats.org/presentationml/2006/main" preserve="1" userDrawn="1">
+  <p:cSld name="TT_4_Chart_&amp;_Text">
+    <p:spTree>
+      <p:nvGrpSpPr>
+        <p:cNvPr id="1" name=""/>
+        <p:cNvGrpSpPr/>
+        <p:nvPr/>
+      </p:nvGrpSpPr>
+      <p:grpSpPr>
+        <a:xfrm>
+          <a:off x="0" y="0"/>
+          <a:ext cx="0" cy="0"/>
+          <a:chOff x="0" y="0"/>
+          <a:chExt cx="0" cy="0"/>
+        </a:xfrm>
+      </p:grpSpPr>
+      <p:sp>
+        <p:nvSpPr>
+          <p:cNvPr id="11" name="Footer Placeholder 3">
+            <a:extLst>
+              <a:ext uri="{FF2B5EF4-FFF2-40B4-BE49-F238E27FC236}">
+                <a16:creationId xmlns:a16="http://schemas.microsoft.com/office/drawing/2014/main" id="{DAE038C8-495A-46D3-AE0C-462D123EB0CC}"/>
+              </a:ext>
+            </a:extLst>
+          </p:cNvPr>
+          <p:cNvSpPr>
+            <a:spLocks noGrp="1"/>
+          </p:cNvSpPr>
+          <p:nvPr>
+            <p:ph type="ftr" sz="quarter" idx="3"/>
+          </p:nvPr>
+        </p:nvSpPr>
+        <p:spPr>
+          <a:xfrm>
+            <a:off x="457200" y="6023777"/>
+            <a:ext cx="2476500" cy="365125"/>
+          </a:xfrm>
+          <a:prstGeom prst="rect">
+            <a:avLst/>
+          </a:prstGeom>
+        </p:spPr>
+        <p:txBody>
+          <a:bodyPr vert="horz" lIns="0" tIns="0" rIns="0" bIns="0" rtlCol="0" anchor="b"/>
+          <a:lstStyle>
+            <a:lvl1pPr algn="l">
+              <a:spcBef>
+                <a:spcPts val="0"/>
+              </a:spcBef>
+              <a:defRPr sz="800">
+                <a:solidFill>
+                  <a:schemeClr val="tx1"/>
+                </a:solidFill>
+              </a:defRPr>
+            </a:lvl1pPr>
+          </a:lstStyle>
+          <a:p>
+            <a:r>
+              <a:rPr lang="en-US"/>
+              <a:t>Base:</a:t>
+            </a:r>
+            <a:br>
+              <a:rPr lang="en-US"/>
+            </a:br>
+            <a:r>
+              <a:rPr lang="en-US"/>
+              <a:t>Q:</a:t>
+            </a:r>
+            <a:br>
+              <a:rPr lang="en-US"/>
+            </a:br>
+            <a:r>
+              <a:rPr lang="en-US"/>
+              <a:t>Note:</a:t>
+            </a:r>
+            <a:endParaRPr lang="en-US" dirty="0"/>
+          </a:p>
+        </p:txBody>
+      </p:sp>
+      <p:sp>
+        <p:nvSpPr>
+          <p:cNvPr id="6" name="PPH-SlideNo"/>
+          <p:cNvSpPr>
+            <a:spLocks noGrp="1"/>
+          </p:cNvSpPr>
+          <p:nvPr>
+            <p:ph type="sldNum" sz="quarter" idx="4"/>
+          </p:nvPr>
+        </p:nvSpPr>
+        <p:spPr>
+          <a:xfrm>
+            <a:off x="10608148" y="6550981"/>
+            <a:ext cx="1117599" cy="230823"/>
+          </a:xfrm>
+          <a:prstGeom prst="rect">
+            <a:avLst/>
+          </a:prstGeom>
+        </p:spPr>
+        <p:txBody>
+          <a:bodyPr vert="horz" wrap="none" lIns="0" tIns="0" rIns="0" bIns="0" rtlCol="0" anchor="b"/>
+          <a:lstStyle>
+            <a:lvl1pPr algn="r">
+              <a:spcBef>
+                <a:spcPts val="0"/>
+              </a:spcBef>
+              <a:defRPr sz="800" b="1">
+                <a:solidFill>
+                  <a:schemeClr val="bg2">
+                    <a:lumMod val="50000"/>
+                  </a:schemeClr>
+                </a:solidFill>
+                <a:latin typeface="+mn-lt"/>
+              </a:defRPr>
+            </a:lvl1pPr>
+          </a:lstStyle>
+          <a:p>
+            <a:pPr defTabSz="856716"/>
+            <a:fld id="{7B6B1C32-E567-445C-9FD5-2A0B0A08DD29}" type="slidenum">
+              <a:rPr lang="en-US" smtClean="0"/>
+              <a:pPr defTabSz="856716"/>
+              <a:t>‹#›</a:t>
+            </a:fld>
+            <a:endParaRPr lang="en-US" dirty="0"/>
+          </a:p>
+        </p:txBody>
+      </p:sp>
+      <p:sp>
+        <p:nvSpPr>
+          <p:cNvPr id="10" name="Section Tag">
+            <a:extLst>
+              <a:ext uri="{FF2B5EF4-FFF2-40B4-BE49-F238E27FC236}">
+                <a16:creationId xmlns:a16="http://schemas.microsoft.com/office/drawing/2014/main" id="{862632C5-CE1F-4714-B8E6-9C62993BDD97}"/>
+              </a:ext>
+            </a:extLst>
+          </p:cNvPr>
+          <p:cNvSpPr>
+            <a:spLocks noGrp="1"/>
+          </p:cNvSpPr>
+          <p:nvPr>
+            <p:ph type="body" sz="quarter" idx="16" hasCustomPrompt="1"/>
+          </p:nvPr>
+        </p:nvSpPr>
+        <p:spPr>
+          <a:xfrm>
+            <a:off x="457200" y="425325"/>
+            <a:ext cx="8343146" cy="298952"/>
+          </a:xfrm>
+          <a:prstGeom prst="rect">
+            <a:avLst/>
+          </a:prstGeom>
+        </p:spPr>
+        <p:txBody>
+          <a:bodyPr/>
+          <a:lstStyle>
+            <a:lvl1pPr>
+              <a:defRPr lang="en-US" sz="1400" b="1" kern="1200" cap="all" spc="150" baseline="0" dirty="0">
+                <a:solidFill>
+                  <a:schemeClr val="bg2">
+                    <a:lumMod val="50000"/>
+                  </a:schemeClr>
+                </a:solidFill>
+                <a:latin typeface="+mn-lt"/>
+                <a:ea typeface="Georgia" charset="0"/>
+                <a:cs typeface="Georgia" charset="0"/>
+              </a:defRPr>
+            </a:lvl1pPr>
+            <a:lvl2pPr marL="0" indent="0">
+              <a:buNone/>
+              <a:defRPr/>
+            </a:lvl2pPr>
+          </a:lstStyle>
+          <a:p>
+            <a:pPr marL="0" lvl="0" indent="0" algn="l" defTabSz="906199" rtl="0" eaLnBrk="1" latinLnBrk="0" hangingPunct="1">
+              <a:spcBef>
+                <a:spcPts val="0"/>
+              </a:spcBef>
+              <a:spcAft>
+                <a:spcPts val="800"/>
+              </a:spcAft>
+              <a:buClrTx/>
+              <a:buFont typeface="Calibri" panose="020F0502020204030204" pitchFamily="34" charset="0"/>
+              <a:buNone/>
+            </a:pPr>
+            <a:r>
+              <a:rPr lang="en-US" dirty="0"/>
+              <a:t>SECTION TAG</a:t>
+            </a:r>
+          </a:p>
+        </p:txBody>
+      </p:sp>
+      <p:sp>
+        <p:nvSpPr>
+          <p:cNvPr id="16" name="Chart 5">
+            <a:extLst>
+              <a:ext uri="{FF2B5EF4-FFF2-40B4-BE49-F238E27FC236}">
+                <a16:creationId xmlns:a16="http://schemas.microsoft.com/office/drawing/2014/main" id="{8DA1412E-5833-4015-AAA2-0C72380BBCFE}"/>
+              </a:ext>
+            </a:extLst>
+          </p:cNvPr>
+          <p:cNvSpPr>
+            <a:spLocks noGrp="1"/>
+          </p:cNvSpPr>
+          <p:nvPr>
+            <p:ph type="chart" sz="quarter" idx="24"/>
+          </p:nvPr>
+        </p:nvSpPr>
+        <p:spPr>
+          <a:xfrm>
+            <a:off x="3390900" y="951101"/>
+            <a:ext cx="3950615" cy="2503087"/>
+          </a:xfrm>
+          <a:prstGeom prst="rect">
+            <a:avLst/>
+          </a:prstGeom>
+        </p:spPr>
+        <p:txBody>
+          <a:bodyPr/>
+          <a:lstStyle/>
+          <a:p>
+            <a:endParaRPr lang="en-US" dirty="0"/>
+          </a:p>
+        </p:txBody>
+      </p:sp>
+      <p:sp>
+        <p:nvSpPr>
+          <p:cNvPr id="15" name="Chart 4">
+            <a:extLst>
+              <a:ext uri="{FF2B5EF4-FFF2-40B4-BE49-F238E27FC236}">
+                <a16:creationId xmlns:a16="http://schemas.microsoft.com/office/drawing/2014/main" id="{4564C230-395F-4C21-8193-F363F3D023EF}"/>
+              </a:ext>
+            </a:extLst>
+          </p:cNvPr>
+          <p:cNvSpPr>
+            <a:spLocks noGrp="1"/>
+          </p:cNvSpPr>
+          <p:nvPr>
+            <p:ph type="chart" sz="quarter" idx="23"/>
+          </p:nvPr>
+        </p:nvSpPr>
+        <p:spPr>
+          <a:xfrm>
+            <a:off x="7775539" y="962973"/>
+            <a:ext cx="3950208" cy="2503087"/>
+          </a:xfrm>
+          <a:prstGeom prst="rect">
+            <a:avLst/>
+          </a:prstGeom>
+        </p:spPr>
+        <p:txBody>
+          <a:bodyPr/>
+          <a:lstStyle/>
+          <a:p>
+            <a:endParaRPr lang="en-US" dirty="0"/>
+          </a:p>
+        </p:txBody>
+      </p:sp>
+      <p:sp>
+        <p:nvSpPr>
+          <p:cNvPr id="12" name="Chart 2">
+            <a:extLst>
+              <a:ext uri="{FF2B5EF4-FFF2-40B4-BE49-F238E27FC236}">
+                <a16:creationId xmlns:a16="http://schemas.microsoft.com/office/drawing/2014/main" id="{360FEB04-7853-4575-85C5-0B6E6F0C8384}"/>
+              </a:ext>
+            </a:extLst>
+          </p:cNvPr>
+          <p:cNvSpPr>
+            <a:spLocks noGrp="1"/>
+          </p:cNvSpPr>
+          <p:nvPr>
+            <p:ph type="chart" sz="quarter" idx="19"/>
+          </p:nvPr>
+        </p:nvSpPr>
+        <p:spPr>
+          <a:xfrm>
+            <a:off x="3391307" y="3911388"/>
+            <a:ext cx="3950208" cy="2477514"/>
+          </a:xfrm>
+          <a:prstGeom prst="rect">
+            <a:avLst/>
+          </a:prstGeom>
+        </p:spPr>
+        <p:txBody>
+          <a:bodyPr/>
+          <a:lstStyle/>
+          <a:p>
+            <a:endParaRPr lang="en-US" dirty="0"/>
+          </a:p>
+        </p:txBody>
+      </p:sp>
+      <p:sp>
+        <p:nvSpPr>
+          <p:cNvPr id="9" name="Chart 1">
+            <a:extLst>
+              <a:ext uri="{FF2B5EF4-FFF2-40B4-BE49-F238E27FC236}">
+                <a16:creationId xmlns:a16="http://schemas.microsoft.com/office/drawing/2014/main" id="{F4A6D268-AFCF-4422-BA46-0325498708B6}"/>
+              </a:ext>
+            </a:extLst>
+          </p:cNvPr>
+          <p:cNvSpPr>
+            <a:spLocks noGrp="1"/>
+          </p:cNvSpPr>
+          <p:nvPr>
+            <p:ph type="chart" sz="quarter" idx="17"/>
+          </p:nvPr>
+        </p:nvSpPr>
+        <p:spPr>
+          <a:xfrm>
+            <a:off x="7775539" y="3923286"/>
+            <a:ext cx="3950208" cy="2477514"/>
+          </a:xfrm>
+          <a:prstGeom prst="rect">
+            <a:avLst/>
+          </a:prstGeom>
+        </p:spPr>
+        <p:txBody>
+          <a:bodyPr/>
+          <a:lstStyle/>
+          <a:p>
+            <a:endParaRPr lang="en-US" dirty="0"/>
+          </a:p>
+        </p:txBody>
+      </p:sp>
+      <p:sp>
+        <p:nvSpPr>
+          <p:cNvPr id="18" name="BodyCopy 1">
+            <a:extLst>
+              <a:ext uri="{FF2B5EF4-FFF2-40B4-BE49-F238E27FC236}">
+                <a16:creationId xmlns:a16="http://schemas.microsoft.com/office/drawing/2014/main" id="{BDC876CF-887F-4124-863C-6624C88B7E36}"/>
+              </a:ext>
+            </a:extLst>
+          </p:cNvPr>
+          <p:cNvSpPr>
+            <a:spLocks noGrp="1"/>
+          </p:cNvSpPr>
+          <p:nvPr>
+            <p:ph type="body" sz="quarter" idx="22"/>
+          </p:nvPr>
+        </p:nvSpPr>
+        <p:spPr>
+          <a:xfrm>
+            <a:off x="457201" y="951101"/>
+            <a:ext cx="2466364" cy="4879331"/>
+          </a:xfrm>
+          <a:prstGeom prst="rect">
+            <a:avLst/>
+          </a:prstGeom>
+        </p:spPr>
+        <p:txBody>
+          <a:bodyPr anchor="ctr"/>
+          <a:lstStyle>
+            <a:lvl1pPr>
+              <a:defRPr sz="1800"/>
+            </a:lvl1pPr>
+            <a:lvl2pPr marL="0" indent="0">
+              <a:buNone/>
+              <a:defRPr sz="1100"/>
+            </a:lvl2pPr>
+            <a:lvl3pPr marL="173038" indent="-173038">
+              <a:buClr>
+                <a:schemeClr val="bg2">
+                  <a:lumMod val="50000"/>
+                </a:schemeClr>
+              </a:buClr>
+              <a:buFont typeface="Arial" panose="020B0604020202020204" pitchFamily="34" charset="0"/>
+              <a:buChar char="●"/>
+              <a:defRPr sz="1100" b="0"/>
+            </a:lvl3pPr>
+            <a:lvl4pPr marL="344488" indent="-171450">
+              <a:defRPr sz="1100"/>
+            </a:lvl4pPr>
+            <a:lvl5pPr marL="0" indent="0">
+              <a:buNone/>
+              <a:defRPr sz="1100" i="1">
+                <a:solidFill>
+                  <a:schemeClr val="accent1"/>
+                </a:solidFill>
+              </a:defRPr>
+            </a:lvl5pPr>
+            <a:lvl6pPr marL="0" indent="0">
+              <a:defRPr lang="en-US" sz="900" kern="1200" dirty="0">
+                <a:solidFill>
+                  <a:schemeClr val="bg2">
+                    <a:lumMod val="50000"/>
+                  </a:schemeClr>
+                </a:solidFill>
+                <a:latin typeface="+mn-lt"/>
+                <a:ea typeface="+mn-ea"/>
+                <a:cs typeface="+mn-cs"/>
+              </a:defRPr>
+            </a:lvl6pPr>
+          </a:lstStyle>
+          <a:p>
+            <a:pPr lvl="0"/>
+            <a:r>
+              <a:rPr lang="en-US" dirty="0"/>
+              <a:t>Click to edit Master text styles</a:t>
+            </a:r>
+          </a:p>
+          <a:p>
+            <a:pPr lvl="1"/>
+            <a:r>
+              <a:rPr lang="en-US" dirty="0"/>
+              <a:t>Second level</a:t>
+            </a:r>
+          </a:p>
+          <a:p>
+            <a:pPr lvl="2"/>
+            <a:r>
+              <a:rPr lang="en-US" dirty="0"/>
+              <a:t>Third level</a:t>
+            </a:r>
+          </a:p>
+          <a:p>
+            <a:pPr lvl="3"/>
+            <a:r>
+              <a:rPr lang="en-US" dirty="0"/>
+              <a:t>Fourth level</a:t>
+            </a:r>
+          </a:p>
+          <a:p>
+            <a:pPr lvl="4"/>
+            <a:r>
+              <a:rPr lang="en-US" dirty="0"/>
+              <a:t>Fifth level</a:t>
+            </a:r>
+          </a:p>
+          <a:p>
+            <a:pPr marL="0" lvl="5" indent="0" algn="l" defTabSz="906199" rtl="0" eaLnBrk="1" latinLnBrk="0" hangingPunct="1">
+              <a:spcBef>
+                <a:spcPts val="0"/>
+              </a:spcBef>
+              <a:spcAft>
+                <a:spcPts val="600"/>
+              </a:spcAft>
+              <a:buFont typeface="Arial" panose="020B0604020202020204" pitchFamily="34" charset="0"/>
+              <a:buNone/>
+            </a:pPr>
+            <a:r>
+              <a:rPr lang="en-US" dirty="0"/>
+              <a:t>Sixth level</a:t>
+            </a:r>
+          </a:p>
+        </p:txBody>
+      </p:sp>
+    </p:spTree>
+    <p:custDataLst>
+      <p:tags r:id="rId1"/>
+    </p:custDataLst>
+    <p:extLst>
+      <p:ext uri="{BB962C8B-B14F-4D97-AF65-F5344CB8AC3E}">
         <p14:creationId xmlns:p14="http://schemas.microsoft.com/office/powerpoint/2010/main" val="955303493"/>
       </p:ext>
     </p:extLst>
@@ -12350,7 +12657,7 @@
 </p:sldLayout>
 </file>
 
-<file path=ppt/slideLayouts/slideLayout31.xml><?xml version="1.0" encoding="utf-8"?>
+<file path=ppt/slideLayouts/slideLayout32.xml><?xml version="1.0" encoding="utf-8"?>
 <p:sldLayout xmlns:a="http://schemas.openxmlformats.org/drawingml/2006/main" xmlns:r="http://schemas.openxmlformats.org/officeDocument/2006/relationships" xmlns:p="http://schemas.openxmlformats.org/presentationml/2006/main" preserve="1" userDrawn="1">
   <p:cSld name="TT_6_Chart_&amp;_Text">
     <p:spTree>
@@ -12876,7 +13183,7 @@
 </p:sldLayout>
 </file>
 
-<file path=ppt/slideLayouts/slideLayout32.xml><?xml version="1.0" encoding="utf-8"?>
+<file path=ppt/slideLayouts/slideLayout33.xml><?xml version="1.0" encoding="utf-8"?>
 <p:sldLayout xmlns:a="http://schemas.openxmlformats.org/drawingml/2006/main" xmlns:r="http://schemas.openxmlformats.org/officeDocument/2006/relationships" xmlns:p="http://schemas.openxmlformats.org/presentationml/2006/main" preserve="1" userDrawn="1">
   <p:cSld name="TT_8_Chart">
     <p:spTree>
@@ -13356,7 +13663,7 @@
 </p:sldLayout>
 </file>
 
-<file path=ppt/slideLayouts/slideLayout33.xml><?xml version="1.0" encoding="utf-8"?>
+<file path=ppt/slideLayouts/slideLayout34.xml><?xml version="1.0" encoding="utf-8"?>
 <p:sldLayout xmlns:a="http://schemas.openxmlformats.org/drawingml/2006/main" xmlns:r="http://schemas.openxmlformats.org/officeDocument/2006/relationships" xmlns:p="http://schemas.openxmlformats.org/presentationml/2006/main" preserve="1" userDrawn="1">
   <p:cSld name="TT_3_chart_2_table">
     <p:spTree>
@@ -13731,7 +14038,7 @@
 </p:sldLayout>
 </file>
 
-<file path=ppt/slideLayouts/slideLayout34.xml><?xml version="1.0" encoding="utf-8"?>
+<file path=ppt/slideLayouts/slideLayout35.xml><?xml version="1.0" encoding="utf-8"?>
 <p:sldLayout xmlns:a="http://schemas.openxmlformats.org/drawingml/2006/main" xmlns:r="http://schemas.openxmlformats.org/officeDocument/2006/relationships" xmlns:p="http://schemas.openxmlformats.org/presentationml/2006/main" preserve="1" userDrawn="1">
   <p:cSld name="TT_Special Illustration Callout">
     <p:spTree>
@@ -14345,7 +14652,7 @@
 </p:sldLayout>
 </file>
 
-<file path=ppt/slideLayouts/slideLayout35.xml><?xml version="1.0" encoding="utf-8"?>
+<file path=ppt/slideLayouts/slideLayout36.xml><?xml version="1.0" encoding="utf-8"?>
 <p:sldLayout xmlns:a="http://schemas.openxmlformats.org/drawingml/2006/main" xmlns:r="http://schemas.openxmlformats.org/officeDocument/2006/relationships" xmlns:p="http://schemas.openxmlformats.org/presentationml/2006/main" preserve="1" userDrawn="1">
   <p:cSld name="TT_Example_w_Photo">
     <p:spTree>
@@ -14885,7 +15192,7 @@
 </p:sldLayout>
 </file>
 
-<file path=ppt/slideLayouts/slideLayout36.xml><?xml version="1.0" encoding="utf-8"?>
+<file path=ppt/slideLayouts/slideLayout37.xml><?xml version="1.0" encoding="utf-8"?>
 <p:sldLayout xmlns:a="http://schemas.openxmlformats.org/drawingml/2006/main" xmlns:r="http://schemas.openxmlformats.org/officeDocument/2006/relationships" xmlns:p="http://schemas.openxmlformats.org/presentationml/2006/main" preserve="1" userDrawn="1">
   <p:cSld name="TT_Example_w_Tech">
     <p:spTree>
@@ -15432,7 +15739,7 @@
 </p:sldLayout>
 </file>
 
-<file path=ppt/slideLayouts/slideLayout37.xml><?xml version="1.0" encoding="utf-8"?>
+<file path=ppt/slideLayouts/slideLayout38.xml><?xml version="1.0" encoding="utf-8"?>
 <p:sldLayout xmlns:a="http://schemas.openxmlformats.org/drawingml/2006/main" xmlns:r="http://schemas.openxmlformats.org/officeDocument/2006/relationships" xmlns:p="http://schemas.openxmlformats.org/presentationml/2006/main" preserve="1" userDrawn="1">
   <p:cSld name="TT_Example_w_Multi_Photos">
     <p:spTree>
@@ -16048,7 +16355,7 @@
 </p:sldLayout>
 </file>
 
-<file path=ppt/slideLayouts/slideLayout38.xml><?xml version="1.0" encoding="utf-8"?>
+<file path=ppt/slideLayouts/slideLayout39.xml><?xml version="1.0" encoding="utf-8"?>
 <p:sldLayout xmlns:a="http://schemas.openxmlformats.org/drawingml/2006/main" xmlns:r="http://schemas.openxmlformats.org/officeDocument/2006/relationships" xmlns:p="http://schemas.openxmlformats.org/presentationml/2006/main" preserve="1" userDrawn="1">
   <p:cSld name="TT_4_Photo_Text">
     <p:spTree>
@@ -16967,218 +17274,6 @@
     <p:extLst>
       <p:ext uri="{BB962C8B-B14F-4D97-AF65-F5344CB8AC3E}">
         <p14:creationId xmlns:p14="http://schemas.microsoft.com/office/powerpoint/2010/main" val="3795615286"/>
-      </p:ext>
-    </p:extLst>
-  </p:cSld>
-  <p:clrMapOvr>
-    <a:masterClrMapping/>
-  </p:clrMapOvr>
-</p:sldLayout>
-</file>
-
-<file path=ppt/slideLayouts/slideLayout39.xml><?xml version="1.0" encoding="utf-8"?>
-<p:sldLayout xmlns:a="http://schemas.openxmlformats.org/drawingml/2006/main" xmlns:r="http://schemas.openxmlformats.org/officeDocument/2006/relationships" xmlns:p="http://schemas.openxmlformats.org/presentationml/2006/main" preserve="1" userDrawn="1">
-  <p:cSld name="TT_Special_Visualization">
-    <p:spTree>
-      <p:nvGrpSpPr>
-        <p:cNvPr id="1" name=""/>
-        <p:cNvGrpSpPr/>
-        <p:nvPr/>
-      </p:nvGrpSpPr>
-      <p:grpSpPr>
-        <a:xfrm>
-          <a:off x="0" y="0"/>
-          <a:ext cx="0" cy="0"/>
-          <a:chOff x="0" y="0"/>
-          <a:chExt cx="0" cy="0"/>
-        </a:xfrm>
-      </p:grpSpPr>
-      <p:sp>
-        <p:nvSpPr>
-          <p:cNvPr id="10" name="Section Tag">
-            <a:extLst>
-              <a:ext uri="{FF2B5EF4-FFF2-40B4-BE49-F238E27FC236}">
-                <a16:creationId xmlns:a16="http://schemas.microsoft.com/office/drawing/2014/main" id="{55150728-4341-4B41-8873-2473ED31348B}"/>
-              </a:ext>
-            </a:extLst>
-          </p:cNvPr>
-          <p:cNvSpPr>
-            <a:spLocks noGrp="1"/>
-          </p:cNvSpPr>
-          <p:nvPr>
-            <p:ph type="body" sz="quarter" idx="17" hasCustomPrompt="1"/>
-          </p:nvPr>
-        </p:nvSpPr>
-        <p:spPr>
-          <a:xfrm>
-            <a:off x="457200" y="425325"/>
-            <a:ext cx="8343146" cy="298952"/>
-          </a:xfrm>
-          <a:prstGeom prst="rect">
-            <a:avLst/>
-          </a:prstGeom>
-        </p:spPr>
-        <p:txBody>
-          <a:bodyPr/>
-          <a:lstStyle>
-            <a:lvl1pPr>
-              <a:defRPr lang="en-US" sz="1400" b="1" kern="1200" cap="all" spc="150" baseline="0" dirty="0">
-                <a:solidFill>
-                  <a:schemeClr val="bg2">
-                    <a:lumMod val="50000"/>
-                  </a:schemeClr>
-                </a:solidFill>
-                <a:latin typeface="+mn-lt"/>
-                <a:ea typeface="Georgia" charset="0"/>
-                <a:cs typeface="Georgia" charset="0"/>
-              </a:defRPr>
-            </a:lvl1pPr>
-            <a:lvl2pPr marL="0" indent="0">
-              <a:buNone/>
-              <a:defRPr/>
-            </a:lvl2pPr>
-          </a:lstStyle>
-          <a:p>
-            <a:pPr marL="0" lvl="0" indent="0" algn="l" defTabSz="906199" rtl="0" eaLnBrk="1" latinLnBrk="0" hangingPunct="1">
-              <a:spcBef>
-                <a:spcPts val="0"/>
-              </a:spcBef>
-              <a:spcAft>
-                <a:spcPts val="800"/>
-              </a:spcAft>
-              <a:buClrTx/>
-              <a:buFont typeface="Calibri" panose="020F0502020204030204" pitchFamily="34" charset="0"/>
-              <a:buNone/>
-            </a:pPr>
-            <a:r>
-              <a:rPr lang="en-US" dirty="0"/>
-              <a:t>SECTION TAG</a:t>
-            </a:r>
-          </a:p>
-        </p:txBody>
-      </p:sp>
-      <p:sp>
-        <p:nvSpPr>
-          <p:cNvPr id="12" name="PPH-SlideNo">
-            <a:extLst>
-              <a:ext uri="{FF2B5EF4-FFF2-40B4-BE49-F238E27FC236}">
-                <a16:creationId xmlns:a16="http://schemas.microsoft.com/office/drawing/2014/main" id="{DBA39A55-636A-468D-B611-5A1119D289C5}"/>
-              </a:ext>
-            </a:extLst>
-          </p:cNvPr>
-          <p:cNvSpPr>
-            <a:spLocks noGrp="1"/>
-          </p:cNvSpPr>
-          <p:nvPr>
-            <p:ph type="sldNum" sz="quarter" idx="4"/>
-          </p:nvPr>
-        </p:nvSpPr>
-        <p:spPr>
-          <a:xfrm>
-            <a:off x="10608148" y="6550981"/>
-            <a:ext cx="1117599" cy="230823"/>
-          </a:xfrm>
-          <a:prstGeom prst="rect">
-            <a:avLst/>
-          </a:prstGeom>
-        </p:spPr>
-        <p:txBody>
-          <a:bodyPr vert="horz" wrap="none" lIns="0" tIns="0" rIns="0" bIns="0" rtlCol="0" anchor="b"/>
-          <a:lstStyle>
-            <a:lvl1pPr algn="r">
-              <a:spcBef>
-                <a:spcPts val="0"/>
-              </a:spcBef>
-              <a:defRPr sz="800" b="1">
-                <a:solidFill>
-                  <a:schemeClr val="bg2">
-                    <a:lumMod val="50000"/>
-                  </a:schemeClr>
-                </a:solidFill>
-                <a:latin typeface="+mn-lt"/>
-              </a:defRPr>
-            </a:lvl1pPr>
-          </a:lstStyle>
-          <a:p>
-            <a:pPr defTabSz="856716"/>
-            <a:fld id="{7B6B1C32-E567-445C-9FD5-2A0B0A08DD29}" type="slidenum">
-              <a:rPr lang="en-US" smtClean="0"/>
-              <a:pPr defTabSz="856716"/>
-              <a:t>‹#›</a:t>
-            </a:fld>
-            <a:endParaRPr lang="en-US" dirty="0"/>
-          </a:p>
-        </p:txBody>
-      </p:sp>
-      <p:sp>
-        <p:nvSpPr>
-          <p:cNvPr id="5" name="Footer Placeholder 3">
-            <a:extLst>
-              <a:ext uri="{FF2B5EF4-FFF2-40B4-BE49-F238E27FC236}">
-                <a16:creationId xmlns:a16="http://schemas.microsoft.com/office/drawing/2014/main" id="{0B9345FC-55C6-4F36-98AC-3712C9F3EDFA}"/>
-              </a:ext>
-            </a:extLst>
-          </p:cNvPr>
-          <p:cNvSpPr>
-            <a:spLocks noGrp="1"/>
-          </p:cNvSpPr>
-          <p:nvPr>
-            <p:ph type="ftr" sz="quarter" idx="3"/>
-          </p:nvPr>
-        </p:nvSpPr>
-        <p:spPr>
-          <a:xfrm>
-            <a:off x="457200" y="6023777"/>
-            <a:ext cx="8343146" cy="365125"/>
-          </a:xfrm>
-          <a:prstGeom prst="rect">
-            <a:avLst/>
-          </a:prstGeom>
-        </p:spPr>
-        <p:txBody>
-          <a:bodyPr vert="horz" lIns="0" tIns="0" rIns="0" bIns="0" rtlCol="0" anchor="b"/>
-          <a:lstStyle>
-            <a:lvl1pPr algn="l">
-              <a:spcBef>
-                <a:spcPts val="0"/>
-              </a:spcBef>
-              <a:defRPr sz="800">
-                <a:solidFill>
-                  <a:schemeClr val="tx1"/>
-                </a:solidFill>
-              </a:defRPr>
-            </a:lvl1pPr>
-          </a:lstStyle>
-          <a:p>
-            <a:r>
-              <a:rPr lang="en-US"/>
-              <a:t>Base:</a:t>
-            </a:r>
-            <a:br>
-              <a:rPr lang="en-US"/>
-            </a:br>
-            <a:r>
-              <a:rPr lang="en-US"/>
-              <a:t>Q:</a:t>
-            </a:r>
-            <a:br>
-              <a:rPr lang="en-US"/>
-            </a:br>
-            <a:r>
-              <a:rPr lang="en-US"/>
-              <a:t>Note:</a:t>
-            </a:r>
-            <a:endParaRPr lang="en-US" dirty="0"/>
-          </a:p>
-        </p:txBody>
-      </p:sp>
-    </p:spTree>
-    <p:custDataLst>
-      <p:tags r:id="rId1"/>
-    </p:custDataLst>
-    <p:extLst>
-      <p:ext uri="{BB962C8B-B14F-4D97-AF65-F5344CB8AC3E}">
-        <p14:creationId xmlns:p14="http://schemas.microsoft.com/office/powerpoint/2010/main" val="4072507329"/>
       </p:ext>
     </p:extLst>
   </p:cSld>
@@ -17774,6 +17869,218 @@
 </file>
 
 <file path=ppt/slideLayouts/slideLayout40.xml><?xml version="1.0" encoding="utf-8"?>
+<p:sldLayout xmlns:a="http://schemas.openxmlformats.org/drawingml/2006/main" xmlns:r="http://schemas.openxmlformats.org/officeDocument/2006/relationships" xmlns:p="http://schemas.openxmlformats.org/presentationml/2006/main" preserve="1" userDrawn="1">
+  <p:cSld name="TT_Special_Visualization">
+    <p:spTree>
+      <p:nvGrpSpPr>
+        <p:cNvPr id="1" name=""/>
+        <p:cNvGrpSpPr/>
+        <p:nvPr/>
+      </p:nvGrpSpPr>
+      <p:grpSpPr>
+        <a:xfrm>
+          <a:off x="0" y="0"/>
+          <a:ext cx="0" cy="0"/>
+          <a:chOff x="0" y="0"/>
+          <a:chExt cx="0" cy="0"/>
+        </a:xfrm>
+      </p:grpSpPr>
+      <p:sp>
+        <p:nvSpPr>
+          <p:cNvPr id="10" name="Section Tag">
+            <a:extLst>
+              <a:ext uri="{FF2B5EF4-FFF2-40B4-BE49-F238E27FC236}">
+                <a16:creationId xmlns:a16="http://schemas.microsoft.com/office/drawing/2014/main" id="{55150728-4341-4B41-8873-2473ED31348B}"/>
+              </a:ext>
+            </a:extLst>
+          </p:cNvPr>
+          <p:cNvSpPr>
+            <a:spLocks noGrp="1"/>
+          </p:cNvSpPr>
+          <p:nvPr>
+            <p:ph type="body" sz="quarter" idx="17" hasCustomPrompt="1"/>
+          </p:nvPr>
+        </p:nvSpPr>
+        <p:spPr>
+          <a:xfrm>
+            <a:off x="457200" y="425325"/>
+            <a:ext cx="8343146" cy="298952"/>
+          </a:xfrm>
+          <a:prstGeom prst="rect">
+            <a:avLst/>
+          </a:prstGeom>
+        </p:spPr>
+        <p:txBody>
+          <a:bodyPr/>
+          <a:lstStyle>
+            <a:lvl1pPr>
+              <a:defRPr lang="en-US" sz="1400" b="1" kern="1200" cap="all" spc="150" baseline="0" dirty="0">
+                <a:solidFill>
+                  <a:schemeClr val="bg2">
+                    <a:lumMod val="50000"/>
+                  </a:schemeClr>
+                </a:solidFill>
+                <a:latin typeface="+mn-lt"/>
+                <a:ea typeface="Georgia" charset="0"/>
+                <a:cs typeface="Georgia" charset="0"/>
+              </a:defRPr>
+            </a:lvl1pPr>
+            <a:lvl2pPr marL="0" indent="0">
+              <a:buNone/>
+              <a:defRPr/>
+            </a:lvl2pPr>
+          </a:lstStyle>
+          <a:p>
+            <a:pPr marL="0" lvl="0" indent="0" algn="l" defTabSz="906199" rtl="0" eaLnBrk="1" latinLnBrk="0" hangingPunct="1">
+              <a:spcBef>
+                <a:spcPts val="0"/>
+              </a:spcBef>
+              <a:spcAft>
+                <a:spcPts val="800"/>
+              </a:spcAft>
+              <a:buClrTx/>
+              <a:buFont typeface="Calibri" panose="020F0502020204030204" pitchFamily="34" charset="0"/>
+              <a:buNone/>
+            </a:pPr>
+            <a:r>
+              <a:rPr lang="en-US" dirty="0"/>
+              <a:t>SECTION TAG</a:t>
+            </a:r>
+          </a:p>
+        </p:txBody>
+      </p:sp>
+      <p:sp>
+        <p:nvSpPr>
+          <p:cNvPr id="12" name="PPH-SlideNo">
+            <a:extLst>
+              <a:ext uri="{FF2B5EF4-FFF2-40B4-BE49-F238E27FC236}">
+                <a16:creationId xmlns:a16="http://schemas.microsoft.com/office/drawing/2014/main" id="{DBA39A55-636A-468D-B611-5A1119D289C5}"/>
+              </a:ext>
+            </a:extLst>
+          </p:cNvPr>
+          <p:cNvSpPr>
+            <a:spLocks noGrp="1"/>
+          </p:cNvSpPr>
+          <p:nvPr>
+            <p:ph type="sldNum" sz="quarter" idx="4"/>
+          </p:nvPr>
+        </p:nvSpPr>
+        <p:spPr>
+          <a:xfrm>
+            <a:off x="10608148" y="6550981"/>
+            <a:ext cx="1117599" cy="230823"/>
+          </a:xfrm>
+          <a:prstGeom prst="rect">
+            <a:avLst/>
+          </a:prstGeom>
+        </p:spPr>
+        <p:txBody>
+          <a:bodyPr vert="horz" wrap="none" lIns="0" tIns="0" rIns="0" bIns="0" rtlCol="0" anchor="b"/>
+          <a:lstStyle>
+            <a:lvl1pPr algn="r">
+              <a:spcBef>
+                <a:spcPts val="0"/>
+              </a:spcBef>
+              <a:defRPr sz="800" b="1">
+                <a:solidFill>
+                  <a:schemeClr val="bg2">
+                    <a:lumMod val="50000"/>
+                  </a:schemeClr>
+                </a:solidFill>
+                <a:latin typeface="+mn-lt"/>
+              </a:defRPr>
+            </a:lvl1pPr>
+          </a:lstStyle>
+          <a:p>
+            <a:pPr defTabSz="856716"/>
+            <a:fld id="{7B6B1C32-E567-445C-9FD5-2A0B0A08DD29}" type="slidenum">
+              <a:rPr lang="en-US" smtClean="0"/>
+              <a:pPr defTabSz="856716"/>
+              <a:t>‹#›</a:t>
+            </a:fld>
+            <a:endParaRPr lang="en-US" dirty="0"/>
+          </a:p>
+        </p:txBody>
+      </p:sp>
+      <p:sp>
+        <p:nvSpPr>
+          <p:cNvPr id="5" name="Footer Placeholder 3">
+            <a:extLst>
+              <a:ext uri="{FF2B5EF4-FFF2-40B4-BE49-F238E27FC236}">
+                <a16:creationId xmlns:a16="http://schemas.microsoft.com/office/drawing/2014/main" id="{0B9345FC-55C6-4F36-98AC-3712C9F3EDFA}"/>
+              </a:ext>
+            </a:extLst>
+          </p:cNvPr>
+          <p:cNvSpPr>
+            <a:spLocks noGrp="1"/>
+          </p:cNvSpPr>
+          <p:nvPr>
+            <p:ph type="ftr" sz="quarter" idx="3"/>
+          </p:nvPr>
+        </p:nvSpPr>
+        <p:spPr>
+          <a:xfrm>
+            <a:off x="457200" y="6023777"/>
+            <a:ext cx="8343146" cy="365125"/>
+          </a:xfrm>
+          <a:prstGeom prst="rect">
+            <a:avLst/>
+          </a:prstGeom>
+        </p:spPr>
+        <p:txBody>
+          <a:bodyPr vert="horz" lIns="0" tIns="0" rIns="0" bIns="0" rtlCol="0" anchor="b"/>
+          <a:lstStyle>
+            <a:lvl1pPr algn="l">
+              <a:spcBef>
+                <a:spcPts val="0"/>
+              </a:spcBef>
+              <a:defRPr sz="800">
+                <a:solidFill>
+                  <a:schemeClr val="tx1"/>
+                </a:solidFill>
+              </a:defRPr>
+            </a:lvl1pPr>
+          </a:lstStyle>
+          <a:p>
+            <a:r>
+              <a:rPr lang="en-US"/>
+              <a:t>Base:</a:t>
+            </a:r>
+            <a:br>
+              <a:rPr lang="en-US"/>
+            </a:br>
+            <a:r>
+              <a:rPr lang="en-US"/>
+              <a:t>Q:</a:t>
+            </a:r>
+            <a:br>
+              <a:rPr lang="en-US"/>
+            </a:br>
+            <a:r>
+              <a:rPr lang="en-US"/>
+              <a:t>Note:</a:t>
+            </a:r>
+            <a:endParaRPr lang="en-US" dirty="0"/>
+          </a:p>
+        </p:txBody>
+      </p:sp>
+    </p:spTree>
+    <p:custDataLst>
+      <p:tags r:id="rId1"/>
+    </p:custDataLst>
+    <p:extLst>
+      <p:ext uri="{BB962C8B-B14F-4D97-AF65-F5344CB8AC3E}">
+        <p14:creationId xmlns:p14="http://schemas.microsoft.com/office/powerpoint/2010/main" val="4072507329"/>
+      </p:ext>
+    </p:extLst>
+  </p:cSld>
+  <p:clrMapOvr>
+    <a:masterClrMapping/>
+  </p:clrMapOvr>
+</p:sldLayout>
+</file>
+
+<file path=ppt/slideLayouts/slideLayout41.xml><?xml version="1.0" encoding="utf-8"?>
 <p:sldLayout xmlns:a="http://schemas.openxmlformats.org/drawingml/2006/main" xmlns:r="http://schemas.openxmlformats.org/officeDocument/2006/relationships" xmlns:p="http://schemas.openxmlformats.org/presentationml/2006/main" preserve="1" userDrawn="1">
   <p:cSld name="TT_SD_TotalBlank">
     <p:bg>
@@ -17926,7 +18233,7 @@
 </p:sldLayout>
 </file>
 
-<file path=ppt/slideLayouts/slideLayout41.xml><?xml version="1.0" encoding="utf-8"?>
+<file path=ppt/slideLayouts/slideLayout42.xml><?xml version="1.0" encoding="utf-8"?>
 <p:sldLayout xmlns:a="http://schemas.openxmlformats.org/drawingml/2006/main" xmlns:r="http://schemas.openxmlformats.org/officeDocument/2006/relationships" xmlns:p="http://schemas.openxmlformats.org/presentationml/2006/main" preserve="1" userDrawn="1">
   <p:cSld name="TT_End Wrapper_w_Photos">
     <p:spTree>
@@ -19009,7 +19316,7 @@
 </p:sldLayout>
 </file>
 
-<file path=ppt/slideLayouts/slideLayout42.xml><?xml version="1.0" encoding="utf-8"?>
+<file path=ppt/slideLayouts/slideLayout43.xml><?xml version="1.0" encoding="utf-8"?>
 <p:sldLayout xmlns:a="http://schemas.openxmlformats.org/drawingml/2006/main" xmlns:r="http://schemas.openxmlformats.org/officeDocument/2006/relationships" xmlns:p="http://schemas.openxmlformats.org/presentationml/2006/main" preserve="1" userDrawn="1">
   <p:cSld name="TT—Pricing">
     <p:spTree>
@@ -19471,7 +19778,7 @@
 </p:sldLayout>
 </file>
 
-<file path=ppt/slideLayouts/slideLayout43.xml><?xml version="1.0" encoding="utf-8"?>
+<file path=ppt/slideLayouts/slideLayout44.xml><?xml version="1.0" encoding="utf-8"?>
 <p:sldLayout xmlns:a="http://schemas.openxmlformats.org/drawingml/2006/main" xmlns:r="http://schemas.openxmlformats.org/officeDocument/2006/relationships" xmlns:p="http://schemas.openxmlformats.org/presentationml/2006/main" preserve="1" userDrawn="1">
   <p:cSld name="TT—Pricing and Text">
     <p:spTree>
@@ -20073,7 +20380,7 @@
 </p:sldLayout>
 </file>
 
-<file path=ppt/slideLayouts/slideLayout44.xml><?xml version="1.0" encoding="utf-8"?>
+<file path=ppt/slideLayouts/slideLayout45.xml><?xml version="1.0" encoding="utf-8"?>
 <p:sldLayout xmlns:a="http://schemas.openxmlformats.org/drawingml/2006/main" xmlns:r="http://schemas.openxmlformats.org/officeDocument/2006/relationships" xmlns:p="http://schemas.openxmlformats.org/presentationml/2006/main" showMasterSp="0" preserve="1" userDrawn="1">
   <p:cSld name="IGNITE_TitlePage">
     <p:bg>
@@ -23611,7 +23918,7 @@
       </p:sp>
     </p:spTree>
     <p:custDataLst>
-      <p:tags r:id="rId46"/>
+      <p:tags r:id="rId47"/>
     </p:custDataLst>
     <p:extLst>
       <p:ext uri="{BB962C8B-B14F-4D97-AF65-F5344CB8AC3E}">
@@ -23640,31 +23947,32 @@
     <p:sldLayoutId id="2147483683" r:id="rId17"/>
     <p:sldLayoutId id="2147483716" r:id="rId18"/>
     <p:sldLayoutId id="2147483684" r:id="rId19"/>
-    <p:sldLayoutId id="2147483706" r:id="rId20"/>
-    <p:sldLayoutId id="2147483685" r:id="rId21"/>
-    <p:sldLayoutId id="2147483708" r:id="rId22"/>
-    <p:sldLayoutId id="2147483720" r:id="rId23"/>
-    <p:sldLayoutId id="2147483692" r:id="rId24"/>
-    <p:sldLayoutId id="2147483687" r:id="rId25"/>
-    <p:sldLayoutId id="2147483704" r:id="rId26"/>
-    <p:sldLayoutId id="2147483686" r:id="rId27"/>
-    <p:sldLayoutId id="2147483715" r:id="rId28"/>
-    <p:sldLayoutId id="2147483713" r:id="rId29"/>
-    <p:sldLayoutId id="2147483724" r:id="rId30"/>
-    <p:sldLayoutId id="2147483705" r:id="rId31"/>
-    <p:sldLayoutId id="2147483702" r:id="rId32"/>
-    <p:sldLayoutId id="2147483721" r:id="rId33"/>
-    <p:sldLayoutId id="2147483700" r:id="rId34"/>
-    <p:sldLayoutId id="2147483693" r:id="rId35"/>
-    <p:sldLayoutId id="2147483725" r:id="rId36"/>
-    <p:sldLayoutId id="2147483694" r:id="rId37"/>
-    <p:sldLayoutId id="2147483710" r:id="rId38"/>
-    <p:sldLayoutId id="2147483695" r:id="rId39"/>
-    <p:sldLayoutId id="2147483698" r:id="rId40"/>
-    <p:sldLayoutId id="2147483719" r:id="rId41"/>
-    <p:sldLayoutId id="2147483717" r:id="rId42"/>
-    <p:sldLayoutId id="2147483726" r:id="rId43"/>
-    <p:sldLayoutId id="2147483718" r:id="rId44"/>
+    <p:sldLayoutId id="2147483729" r:id="rId20"/>
+    <p:sldLayoutId id="2147483706" r:id="rId21"/>
+    <p:sldLayoutId id="2147483685" r:id="rId22"/>
+    <p:sldLayoutId id="2147483708" r:id="rId23"/>
+    <p:sldLayoutId id="2147483720" r:id="rId24"/>
+    <p:sldLayoutId id="2147483692" r:id="rId25"/>
+    <p:sldLayoutId id="2147483687" r:id="rId26"/>
+    <p:sldLayoutId id="2147483704" r:id="rId27"/>
+    <p:sldLayoutId id="2147483686" r:id="rId28"/>
+    <p:sldLayoutId id="2147483715" r:id="rId29"/>
+    <p:sldLayoutId id="2147483713" r:id="rId30"/>
+    <p:sldLayoutId id="2147483724" r:id="rId31"/>
+    <p:sldLayoutId id="2147483705" r:id="rId32"/>
+    <p:sldLayoutId id="2147483702" r:id="rId33"/>
+    <p:sldLayoutId id="2147483721" r:id="rId34"/>
+    <p:sldLayoutId id="2147483700" r:id="rId35"/>
+    <p:sldLayoutId id="2147483693" r:id="rId36"/>
+    <p:sldLayoutId id="2147483725" r:id="rId37"/>
+    <p:sldLayoutId id="2147483694" r:id="rId38"/>
+    <p:sldLayoutId id="2147483710" r:id="rId39"/>
+    <p:sldLayoutId id="2147483695" r:id="rId40"/>
+    <p:sldLayoutId id="2147483698" r:id="rId41"/>
+    <p:sldLayoutId id="2147483719" r:id="rId42"/>
+    <p:sldLayoutId id="2147483717" r:id="rId43"/>
+    <p:sldLayoutId id="2147483726" r:id="rId44"/>
+    <p:sldLayoutId id="2147483718" r:id="rId45"/>
   </p:sldLayoutIdLst>
   <p:hf hdr="0" dt="0"/>
   <p:txStyles>
@@ -24187,6 +24495,12 @@
 </file>
 
 <file path=ppt/tags/tag36.xml><?xml version="1.0" encoding="utf-8"?>
+<p:tagLst xmlns:a="http://schemas.openxmlformats.org/drawingml/2006/main" xmlns:r="http://schemas.openxmlformats.org/officeDocument/2006/relationships" xmlns:p="http://schemas.openxmlformats.org/presentationml/2006/main">
+  <p:tag name="ARTICULATE_SLIDE_THUMBNAIL_REFRESH" val="1"/>
+</p:tagLst>
+</file>
+
+<file path=ppt/tags/tag37.xml><?xml version="1.0" encoding="utf-8"?>
 <p:tagLst xmlns:a="http://schemas.openxmlformats.org/drawingml/2006/main" xmlns:r="http://schemas.openxmlformats.org/officeDocument/2006/relationships" xmlns:p="http://schemas.openxmlformats.org/presentationml/2006/main">
   <p:tag name="ARTICULATE_SLIDE_THUMBNAIL_REFRESH" val="1"/>
 </p:tagLst>

</xml_diff>

<commit_message>
Updates to allow C-Store KPI reports to function (Added elements to the UI)
</commit_message>
<xml_diff>
--- a/templates/OLD_TEMPLATE.pptx
+++ b/templates/OLD_TEMPLATE.pptx
@@ -24545,12 +24545,12 @@
 <file path=ppt/theme/theme1.xml><?xml version="1.0" encoding="utf-8"?>
 <a:theme xmlns:a="http://schemas.openxmlformats.org/drawingml/2006/main" name="1_Corporate Report Template 05-2014">
   <a:themeElements>
-    <a:clrScheme name="Technomic 2020">
+    <a:clrScheme name="Custom 1">
       <a:dk1>
         <a:srgbClr val="424242"/>
       </a:dk1>
       <a:lt1>
-        <a:srgbClr val="F9F7F5"/>
+        <a:srgbClr val="FFFFFF"/>
       </a:lt1>
       <a:dk2>
         <a:srgbClr val="BEBFB7"/>

</xml_diff>

<commit_message>
DTV Month fix v2
</commit_message>
<xml_diff>
--- a/templates/OLD_TEMPLATE.pptx
+++ b/templates/OLD_TEMPLATE.pptx
@@ -23543,10 +23543,7 @@
     <p:bg>
       <p:bgPr>
         <a:solidFill>
-          <a:schemeClr val="bg1">
-            <a:lumMod val="95000"/>
-            <a:alpha val="50000"/>
-          </a:schemeClr>
+          <a:srgbClr val="F7F5F2"/>
         </a:solidFill>
         <a:effectLst/>
       </p:bgPr>

</xml_diff>